<commit_message>
Update slides with fixed scripts
</commit_message>
<xml_diff>
--- a/genie_python_and_ibex/genie_python_and_ibex.pptx
+++ b/genie_python_and_ibex/genie_python_and_ibex.pptx
@@ -1572,7 +1572,7 @@
             </a:r>
             <a:r>
               <a:rPr lang="en-GB" dirty="0" err="1" smtClean="0"/>
-              <a:t>g.runstate</a:t>
+              <a:t>g.get_runstate</a:t>
             </a:r>
             <a:r>
               <a:rPr lang="en-GB" dirty="0" smtClean="0"/>
@@ -1631,7 +1631,19 @@
             </a:r>
             <a:r>
               <a:rPr lang="en-GB" dirty="0" smtClean="0"/>
-              <a:t> in range(</a:t>
+              <a:t> in </a:t>
+            </a:r>
+            <a:r>
+              <a:rPr lang="en-GB" dirty="0" smtClean="0"/>
+              <a:t>range(</a:t>
+            </a:r>
+            <a:r>
+              <a:rPr lang="en-GB" dirty="0" err="1" smtClean="0"/>
+              <a:t>int</a:t>
+            </a:r>
+            <a:r>
+              <a:rPr lang="en-GB" dirty="0" smtClean="0"/>
+              <a:t>(</a:t>
             </a:r>
             <a:r>
               <a:rPr lang="en-GB" dirty="0" err="1" smtClean="0"/>
@@ -1639,7 +1651,15 @@
             </a:r>
             <a:r>
               <a:rPr lang="en-GB" dirty="0" smtClean="0"/>
-              <a:t>("MY_BLOCK")['value'], 4, -1): </a:t>
+              <a:t>("MY_BLOCK")['value</a:t>
+            </a:r>
+            <a:r>
+              <a:rPr lang="en-GB" dirty="0" smtClean="0"/>
+              <a:t>']), </a:t>
+            </a:r>
+            <a:r>
+              <a:rPr lang="en-GB" dirty="0" smtClean="0"/>
+              <a:t>4, -1): </a:t>
             </a:r>
           </a:p>
           <a:p>
@@ -1758,7 +1778,6 @@
               <a:rPr lang="en-GB" dirty="0" smtClean="0"/>
               <a:t>()</a:t>
             </a:r>
-            <a:endParaRPr lang="en-GB" dirty="0" smtClean="0"/>
           </a:p>
         </p:txBody>
       </p:sp>
@@ -3696,21 +3715,13 @@
           <a:p>
             <a:r>
               <a:rPr lang="en-GB" baseline="0" dirty="0" smtClean="0"/>
-              <a:t>- Prepared </a:t>
-            </a:r>
+              <a:t>- Prepared some slides with info on (in black) and tasks to try (to green)</a:t>
+            </a:r>
+          </a:p>
+          <a:p>
             <a:r>
               <a:rPr lang="en-GB" baseline="0" dirty="0" smtClean="0"/>
-              <a:t>some slides with info on (in black) and tasks to try (to green)</a:t>
-            </a:r>
-          </a:p>
-          <a:p>
-            <a:r>
-              <a:rPr lang="en-GB" baseline="0" dirty="0" smtClean="0"/>
-              <a:t>- You </a:t>
-            </a:r>
-            <a:r>
-              <a:rPr lang="en-GB" baseline="0" dirty="0" smtClean="0"/>
-              <a:t>are in control this is to help you so can ignore slides. Ask questions whenever and you can choose the order</a:t>
+              <a:t>- You are in control this is to help you so can ignore slides. Ask questions whenever and you can choose the order</a:t>
             </a:r>
           </a:p>
           <a:p>
@@ -3722,7 +3733,6 @@
               <a:rPr lang="en-GB" baseline="0" dirty="0" smtClean="0"/>
               <a:t>- Today’s session is scheduled to last for 3 hours</a:t>
             </a:r>
-            <a:endParaRPr lang="en-GB" baseline="0" dirty="0" smtClean="0"/>
           </a:p>
           <a:p>
             <a:pPr marL="0" lvl="0" indent="0">
@@ -4932,7 +4942,6 @@
               <a:rPr lang="en-GB" dirty="0" smtClean="0"/>
               <a:t>The list will be refined as you type more characters.</a:t>
             </a:r>
-            <a:endParaRPr lang="en-GB" dirty="0" smtClean="0"/>
           </a:p>
         </p:txBody>
       </p:sp>
@@ -9957,7 +9966,7 @@
       </p:sp>
       <p:pic>
         <p:nvPicPr>
-          <p:cNvPr id="3074" name="Picture 2"/>
+          <p:cNvPr id="1026" name="Picture 2"/>
           <p:cNvPicPr>
             <a:picLocks noChangeAspect="1" noChangeArrowheads="1"/>
           </p:cNvPicPr>
@@ -9978,8 +9987,8 @@
         </p:blipFill>
         <p:spPr bwMode="auto">
           <a:xfrm>
-            <a:off x="467544" y="1556792"/>
-            <a:ext cx="8136904" cy="4556934"/>
+            <a:off x="647155" y="1556792"/>
+            <a:ext cx="7858125" cy="4448175"/>
           </a:xfrm>
           <a:prstGeom prst="rect">
             <a:avLst/>
@@ -10435,7 +10444,7 @@
       </p:sp>
       <p:pic>
         <p:nvPicPr>
-          <p:cNvPr id="11267" name="Picture 3"/>
+          <p:cNvPr id="2050" name="Picture 2"/>
           <p:cNvPicPr>
             <a:picLocks noChangeAspect="1" noChangeArrowheads="1"/>
           </p:cNvPicPr>
@@ -10456,8 +10465,8 @@
         </p:blipFill>
         <p:spPr bwMode="auto">
           <a:xfrm>
-            <a:off x="1619672" y="1489440"/>
-            <a:ext cx="6048671" cy="4654936"/>
+            <a:off x="2339752" y="1556792"/>
+            <a:ext cx="4740563" cy="4428228"/>
           </a:xfrm>
           <a:prstGeom prst="rect">
             <a:avLst/>
@@ -12726,11 +12735,7 @@
             </a:r>
             <a:r>
               <a:rPr lang="en-GB" sz="2400" dirty="0"/>
-              <a:t>(...)</a:t>
-            </a:r>
-            <a:r>
-              <a:rPr lang="en-GB" sz="2400" dirty="0"/>
-              <a:t> </a:t>
+              <a:t>(...) </a:t>
             </a:r>
             <a:r>
               <a:rPr lang="en-GB" sz="2400" dirty="0" smtClean="0"/>
@@ -15178,7 +15183,7 @@
       </p:sp>
       <p:pic>
         <p:nvPicPr>
-          <p:cNvPr id="25602" name="Picture 2"/>
+          <p:cNvPr id="3074" name="Picture 2"/>
           <p:cNvPicPr>
             <a:picLocks noChangeAspect="1" noChangeArrowheads="1"/>
           </p:cNvPicPr>
@@ -15199,8 +15204,8 @@
         </p:blipFill>
         <p:spPr bwMode="auto">
           <a:xfrm>
-            <a:off x="1547664" y="1556792"/>
-            <a:ext cx="6183037" cy="4429894"/>
+            <a:off x="1619672" y="1628800"/>
+            <a:ext cx="6336704" cy="4477115"/>
           </a:xfrm>
           <a:prstGeom prst="rect">
             <a:avLst/>
@@ -15454,36 +15459,30 @@
               <a:rPr lang="en-GB" dirty="0" smtClean="0">
                 <a:hlinkClick r:id="rId3"/>
               </a:rPr>
-              <a:t>User </a:t>
-            </a:r>
+              <a:t>User Manual</a:t>
+            </a:r>
+          </a:p>
+          <a:p>
+            <a:pPr lvl="1"/>
+            <a:r>
+              <a:rPr lang="en-GB" sz="2000" u="sng" dirty="0">
+                <a:hlinkClick r:id="rId4"/>
+              </a:rPr>
+              <a:t>http://</a:t>
+            </a:r>
+            <a:r>
+              <a:rPr lang="en-GB" sz="2000" u="sng" dirty="0" smtClean="0">
+                <a:hlinkClick r:id="rId4"/>
+              </a:rPr>
+              <a:t>shadow.nd.rl.ac.uk/ibex_user_manual/Home</a:t>
+            </a:r>
+            <a:endParaRPr lang="en-GB" sz="2000" u="sng" dirty="0"/>
+          </a:p>
+          <a:p>
             <a:r>
               <a:rPr lang="en-GB" dirty="0" smtClean="0">
                 <a:hlinkClick r:id="rId3"/>
               </a:rPr>
-              <a:t>Manual</a:t>
-            </a:r>
-          </a:p>
-          <a:p>
-            <a:pPr lvl="1"/>
-            <a:r>
-              <a:rPr lang="en-GB" sz="2000" u="sng" dirty="0">
-                <a:hlinkClick r:id="rId4"/>
-              </a:rPr>
-              <a:t>http://</a:t>
-            </a:r>
-            <a:r>
-              <a:rPr lang="en-GB" sz="2000" u="sng" dirty="0" smtClean="0">
-                <a:hlinkClick r:id="rId4"/>
-              </a:rPr>
-              <a:t>shadow.nd.rl.ac.uk/ibex_user_manual/Home</a:t>
-            </a:r>
-            <a:endParaRPr lang="en-GB" sz="2000" u="sng" dirty="0"/>
-          </a:p>
-          <a:p>
-            <a:r>
-              <a:rPr lang="en-GB" dirty="0" smtClean="0">
-                <a:hlinkClick r:id="rId3"/>
-              </a:rPr>
               <a:t>Course notes</a:t>
             </a:r>
           </a:p>
@@ -15508,13 +15507,7 @@
               <a:rPr lang="en-GB" dirty="0" smtClean="0">
                 <a:hlinkClick r:id="rId6"/>
               </a:rPr>
-              <a:t>Genie </a:t>
-            </a:r>
-            <a:r>
-              <a:rPr lang="en-GB" dirty="0" smtClean="0">
-                <a:hlinkClick r:id="rId6"/>
-              </a:rPr>
-              <a:t>Python Manual</a:t>
+              <a:t>Genie Python Manual</a:t>
             </a:r>
           </a:p>
           <a:p>
@@ -17695,6 +17688,21 @@
 </file>
 
 <file path=customXml/item1.xml><?xml version="1.0" encoding="utf-8"?>
+<?mso-contentType ?>
+<FormTemplates xmlns="http://schemas.microsoft.com/sharepoint/v3/contenttype/forms">
+  <Display>DocumentLibraryForm</Display>
+  <Edit>DocumentLibraryForm</Edit>
+  <New>DocumentLibraryForm</New>
+</FormTemplates>
+</file>
+
+<file path=customXml/item2.xml><?xml version="1.0" encoding="utf-8"?>
+<p:properties xmlns:p="http://schemas.microsoft.com/office/2006/metadata/properties" xmlns:xsi="http://www.w3.org/2001/XMLSchema-instance" xmlns:pc="http://schemas.microsoft.com/office/infopath/2007/PartnerControls">
+  <documentManagement/>
+</p:properties>
+</file>
+
+<file path=customXml/item3.xml><?xml version="1.0" encoding="utf-8"?>
 <ct:contentTypeSchema xmlns:ct="http://schemas.microsoft.com/office/2006/metadata/contentType" xmlns:ma="http://schemas.microsoft.com/office/2006/metadata/properties/metaAttributes" ct:_="" ma:_="" ma:contentTypeName="Document" ma:contentTypeID="0x010100D8BDAAA291872E4C9CBDBAE9DC1F214B" ma:contentTypeVersion="0" ma:contentTypeDescription="Create a new document." ma:contentTypeScope="" ma:versionID="37718d931242bc0231cb88c3dc8184c7">
   <xsd:schema xmlns:xsd="http://www.w3.org/2001/XMLSchema" xmlns:xs="http://www.w3.org/2001/XMLSchema" xmlns:p="http://schemas.microsoft.com/office/2006/metadata/properties" targetNamespace="http://schemas.microsoft.com/office/2006/metadata/properties" ma:root="true" ma:fieldsID="8022916f55ab85163ee9a5069dec31d5">
     <xsd:element name="properties">
@@ -17808,33 +17816,10 @@
 </ct:contentTypeSchema>
 </file>
 
-<file path=customXml/item2.xml><?xml version="1.0" encoding="utf-8"?>
-<p:properties xmlns:p="http://schemas.microsoft.com/office/2006/metadata/properties" xmlns:xsi="http://www.w3.org/2001/XMLSchema-instance" xmlns:pc="http://schemas.microsoft.com/office/infopath/2007/PartnerControls">
-  <documentManagement/>
-</p:properties>
-</file>
-
-<file path=customXml/item3.xml><?xml version="1.0" encoding="utf-8"?>
-<?mso-contentType ?>
-<FormTemplates xmlns="http://schemas.microsoft.com/sharepoint/v3/contenttype/forms">
-  <Display>DocumentLibraryForm</Display>
-  <Edit>DocumentLibraryForm</Edit>
-  <New>DocumentLibraryForm</New>
-</FormTemplates>
-</file>
-
 <file path=customXml/itemProps1.xml><?xml version="1.0" encoding="utf-8"?>
-<ds:datastoreItem xmlns:ds="http://schemas.openxmlformats.org/officeDocument/2006/customXml" ds:itemID="{DD040A56-8D6F-4114-A272-42AE3B7D7ECA}">
+<ds:datastoreItem xmlns:ds="http://schemas.openxmlformats.org/officeDocument/2006/customXml" ds:itemID="{1D176834-956F-4505-BD61-698C091AD5AA}">
   <ds:schemaRefs>
-    <ds:schemaRef ds:uri="http://schemas.microsoft.com/office/2006/metadata/contentType"/>
-    <ds:schemaRef ds:uri="http://schemas.microsoft.com/office/2006/metadata/properties/metaAttributes"/>
-    <ds:schemaRef ds:uri="http://www.w3.org/2001/XMLSchema"/>
-    <ds:schemaRef ds:uri="http://schemas.microsoft.com/office/2006/metadata/properties"/>
-    <ds:schemaRef ds:uri="http://schemas.openxmlformats.org/package/2006/metadata/core-properties"/>
-    <ds:schemaRef ds:uri="http://purl.org/dc/elements/1.1/"/>
-    <ds:schemaRef ds:uri="http://purl.org/dc/terms/"/>
-    <ds:schemaRef ds:uri="http://schemas.microsoft.com/internal/obd"/>
-    <ds:schemaRef ds:uri="http://schemas.microsoft.com/office/infopath/2007/PartnerControls"/>
+    <ds:schemaRef ds:uri="http://schemas.microsoft.com/sharepoint/v3/contenttype/forms"/>
   </ds:schemaRefs>
 </ds:datastoreItem>
 </file>
@@ -17855,9 +17840,17 @@
 </file>
 
 <file path=customXml/itemProps3.xml><?xml version="1.0" encoding="utf-8"?>
-<ds:datastoreItem xmlns:ds="http://schemas.openxmlformats.org/officeDocument/2006/customXml" ds:itemID="{1D176834-956F-4505-BD61-698C091AD5AA}">
+<ds:datastoreItem xmlns:ds="http://schemas.openxmlformats.org/officeDocument/2006/customXml" ds:itemID="{DD040A56-8D6F-4114-A272-42AE3B7D7ECA}">
   <ds:schemaRefs>
-    <ds:schemaRef ds:uri="http://schemas.microsoft.com/sharepoint/v3/contenttype/forms"/>
+    <ds:schemaRef ds:uri="http://schemas.microsoft.com/office/2006/metadata/contentType"/>
+    <ds:schemaRef ds:uri="http://schemas.microsoft.com/office/2006/metadata/properties/metaAttributes"/>
+    <ds:schemaRef ds:uri="http://www.w3.org/2001/XMLSchema"/>
+    <ds:schemaRef ds:uri="http://schemas.microsoft.com/office/2006/metadata/properties"/>
+    <ds:schemaRef ds:uri="http://schemas.openxmlformats.org/package/2006/metadata/core-properties"/>
+    <ds:schemaRef ds:uri="http://purl.org/dc/elements/1.1/"/>
+    <ds:schemaRef ds:uri="http://purl.org/dc/terms/"/>
+    <ds:schemaRef ds:uri="http://schemas.microsoft.com/internal/obd"/>
+    <ds:schemaRef ds:uri="http://schemas.microsoft.com/office/infopath/2007/PartnerControls"/>
   </ds:schemaRefs>
 </ds:datastoreItem>
 </file>
</xml_diff>

<commit_message>
Add a few cosmetic changes based on feedback
</commit_message>
<xml_diff>
--- a/genie_python_and_ibex/genie_python_and_ibex.pptx
+++ b/genie_python_and_ibex/genie_python_and_ibex.pptx
@@ -253,7 +253,7 @@
           <a:p>
             <a:fld id="{0DA9C53C-B82A-4351-B1EF-A4391C7B86A2}" type="datetimeFigureOut">
               <a:rPr lang="en-GB" smtClean="0"/>
-              <a:t>18/07/2017</a:t>
+              <a:t>19/07/2017</a:t>
             </a:fld>
             <a:endParaRPr lang="en-GB" dirty="0"/>
           </a:p>
@@ -2403,7 +2403,7 @@
               <a:t> our old </a:t>
             </a:r>
             <a:r>
-              <a:rPr lang="en-GB" sz="1200" b="0" i="0" kern="1200" baseline="0" dirty="0" err="1" smtClean="0">
+              <a:rPr lang="en-GB" sz="1200" b="0" i="0" kern="1200" baseline="0" dirty="0" smtClean="0">
                 <a:solidFill>
                   <a:schemeClr val="tx1"/>
                 </a:solidFill>
@@ -2412,7 +2412,7 @@
                 <a:ea typeface="+mn-ea"/>
                 <a:cs typeface="+mn-cs"/>
               </a:rPr>
-              <a:t>OpenGENIE</a:t>
+              <a:t> Open GENIE </a:t>
             </a:r>
             <a:r>
               <a:rPr lang="en-GB" sz="1200" b="0" i="0" kern="1200" baseline="0" dirty="0" smtClean="0">
@@ -2424,7 +2424,7 @@
                 <a:ea typeface="+mn-ea"/>
                 <a:cs typeface="+mn-cs"/>
               </a:rPr>
-              <a:t> scripts to </a:t>
+              <a:t>scripts to </a:t>
             </a:r>
             <a:r>
               <a:rPr lang="en-GB" sz="1200" b="0" i="0" kern="1200" baseline="0" dirty="0" err="1" smtClean="0">
@@ -2987,7 +2987,15 @@
             </a:pPr>
             <a:r>
               <a:rPr lang="en-GB" b="0" dirty="0" smtClean="0"/>
-              <a:t>See https://github.com/ISISComputingGroup/ibex_user_manual/wiki/genie_python-and-Ibex-%28Exercise-solutions%29</a:t>
+              <a:t>See https://</a:t>
+            </a:r>
+            <a:r>
+              <a:rPr lang="en-GB" b="0" dirty="0" smtClean="0"/>
+              <a:t>github.com/ISISComputingGroup/IBEX_user_manual/wiki/genie_python-and-IBEX-</a:t>
+            </a:r>
+            <a:r>
+              <a:rPr lang="en-GB" b="0" dirty="0" smtClean="0"/>
+              <a:t>%28Exercise-solutions%29</a:t>
             </a:r>
           </a:p>
         </p:txBody>
@@ -3709,8 +3717,21 @@
             </a:pPr>
             <a:r>
               <a:rPr lang="en-GB" b="0" dirty="0" smtClean="0"/>
-              <a:t>https://github.com/ISISComputingGroup/ibex_user_manual/wiki/genie_python-and-Ibex-%28Converting-from-OpenGENIE%29</a:t>
-            </a:r>
+              <a:t>https://</a:t>
+            </a:r>
+            <a:r>
+              <a:rPr lang="en-GB" b="0" dirty="0" smtClean="0"/>
+              <a:t>github.com/ISISComputingGroup/IBEX_user_manual/wiki/genie_python-and-IBEX-</a:t>
+            </a:r>
+            <a:r>
+              <a:rPr lang="en-GB" b="0" dirty="0" smtClean="0"/>
+              <a:t>%</a:t>
+            </a:r>
+            <a:r>
+              <a:rPr lang="en-GB" b="0" dirty="0" smtClean="0"/>
+              <a:t>28Converting-from- Open GENIE%29</a:t>
+            </a:r>
+            <a:endParaRPr lang="en-GB" b="0" dirty="0" smtClean="0"/>
           </a:p>
         </p:txBody>
       </p:sp>
@@ -4068,7 +4089,43 @@
                 <a:ea typeface="+mn-ea"/>
                 <a:cs typeface="+mn-cs"/>
               </a:rPr>
-              <a:t>Full conversion steps at: https://github.com/ISISComputingGroup/ibex_user_manual/wiki/genie_python-and-Ibex-%28Converting-from-OpenGENIE%29</a:t>
+              <a:t>Full conversion steps at: https://</a:t>
+            </a:r>
+            <a:r>
+              <a:rPr lang="en-GB" sz="1200" b="0" i="0" kern="1200" dirty="0" smtClean="0">
+                <a:solidFill>
+                  <a:schemeClr val="tx1"/>
+                </a:solidFill>
+                <a:effectLst/>
+                <a:latin typeface="+mn-lt"/>
+                <a:ea typeface="+mn-ea"/>
+                <a:cs typeface="+mn-cs"/>
+              </a:rPr>
+              <a:t>github.com/ISISComputingGroup/IBEX_user_manual/wiki/genie_python-and-IBEX-</a:t>
+            </a:r>
+            <a:r>
+              <a:rPr lang="en-GB" sz="1200" b="0" i="0" kern="1200" dirty="0" smtClean="0">
+                <a:solidFill>
+                  <a:schemeClr val="tx1"/>
+                </a:solidFill>
+                <a:effectLst/>
+                <a:latin typeface="+mn-lt"/>
+                <a:ea typeface="+mn-ea"/>
+                <a:cs typeface="+mn-cs"/>
+              </a:rPr>
+              <a:t>%</a:t>
+            </a:r>
+            <a:r>
+              <a:rPr lang="en-GB" sz="1200" b="0" i="0" kern="1200" dirty="0" smtClean="0">
+                <a:solidFill>
+                  <a:schemeClr val="tx1"/>
+                </a:solidFill>
+                <a:effectLst/>
+                <a:latin typeface="+mn-lt"/>
+                <a:ea typeface="+mn-ea"/>
+                <a:cs typeface="+mn-cs"/>
+              </a:rPr>
+              <a:t>28Converting-from- Open GENIE%29</a:t>
             </a:r>
             <a:endParaRPr lang="en-GB" sz="1200" b="0" i="0" kern="1200" dirty="0">
               <a:solidFill>
@@ -4176,7 +4233,31 @@
                 <a:ea typeface="+mn-ea"/>
                 <a:cs typeface="+mn-cs"/>
               </a:rPr>
-              <a:t>https://github.com/ISISComputingGroup/ibex_user_manual/wiki/genie_python-and-Ibex-%28Exercise-solutions%29</a:t>
+              <a:t>https://</a:t>
+            </a:r>
+            <a:r>
+              <a:rPr lang="en-GB" sz="1200" b="0" i="0" kern="1200" dirty="0" smtClean="0">
+                <a:solidFill>
+                  <a:schemeClr val="tx1"/>
+                </a:solidFill>
+                <a:effectLst/>
+                <a:latin typeface="+mn-lt"/>
+                <a:ea typeface="+mn-ea"/>
+                <a:cs typeface="+mn-cs"/>
+              </a:rPr>
+              <a:t>github.com/ISISComputingGroup/IBEX_user_manual/wiki/genie_python-and-IBEX-</a:t>
+            </a:r>
+            <a:r>
+              <a:rPr lang="en-GB" sz="1200" b="0" i="0" kern="1200" dirty="0" smtClean="0">
+                <a:solidFill>
+                  <a:schemeClr val="tx1"/>
+                </a:solidFill>
+                <a:effectLst/>
+                <a:latin typeface="+mn-lt"/>
+                <a:ea typeface="+mn-ea"/>
+                <a:cs typeface="+mn-cs"/>
+              </a:rPr>
+              <a:t>%28Exercise-solutions%29</a:t>
             </a:r>
           </a:p>
           <a:p>
@@ -4460,14 +4541,8 @@
                 <a:ea typeface="+mn-ea"/>
                 <a:cs typeface="+mn-cs"/>
               </a:rPr>
-              <a:t> commands is from the scripting perspective of the Ibex client.</a:t>
-            </a:r>
-          </a:p>
-          <a:p>
-            <a:pPr marL="171450" indent="-171450">
-              <a:buFontTx/>
-              <a:buChar char="-"/>
-            </a:pPr>
+              <a:t> commands is from the scripting perspective of the </a:t>
+            </a:r>
             <a:r>
               <a:rPr lang="en-GB" sz="1200" b="0" i="0" kern="1200" dirty="0" smtClean="0">
                 <a:solidFill>
@@ -4478,14 +4553,8 @@
                 <a:ea typeface="+mn-ea"/>
                 <a:cs typeface="+mn-cs"/>
               </a:rPr>
-              <a:t>To open a scripting window:</a:t>
-            </a:r>
-          </a:p>
-          <a:p>
-            <a:pPr marL="628650" lvl="1" indent="-171450">
-              <a:buFontTx/>
-              <a:buChar char="-"/>
-            </a:pPr>
+              <a:t>IBEX </a:t>
+            </a:r>
             <a:r>
               <a:rPr lang="en-GB" sz="1200" b="0" i="0" kern="1200" dirty="0" smtClean="0">
                 <a:solidFill>
@@ -4496,7 +4565,67 @@
                 <a:ea typeface="+mn-ea"/>
                 <a:cs typeface="+mn-cs"/>
               </a:rPr>
-              <a:t>Start the Ibex client </a:t>
+              <a:t>client.</a:t>
+            </a:r>
+          </a:p>
+          <a:p>
+            <a:pPr marL="171450" indent="-171450">
+              <a:buFontTx/>
+              <a:buChar char="-"/>
+            </a:pPr>
+            <a:r>
+              <a:rPr lang="en-GB" sz="1200" b="0" i="0" kern="1200" dirty="0" smtClean="0">
+                <a:solidFill>
+                  <a:schemeClr val="tx1"/>
+                </a:solidFill>
+                <a:effectLst/>
+                <a:latin typeface="+mn-lt"/>
+                <a:ea typeface="+mn-ea"/>
+                <a:cs typeface="+mn-cs"/>
+              </a:rPr>
+              <a:t>To open a scripting window:</a:t>
+            </a:r>
+          </a:p>
+          <a:p>
+            <a:pPr marL="628650" lvl="1" indent="-171450">
+              <a:buFontTx/>
+              <a:buChar char="-"/>
+            </a:pPr>
+            <a:r>
+              <a:rPr lang="en-GB" sz="1200" b="0" i="0" kern="1200" dirty="0" smtClean="0">
+                <a:solidFill>
+                  <a:schemeClr val="tx1"/>
+                </a:solidFill>
+                <a:effectLst/>
+                <a:latin typeface="+mn-lt"/>
+                <a:ea typeface="+mn-ea"/>
+                <a:cs typeface="+mn-cs"/>
+              </a:rPr>
+              <a:t>Start the </a:t>
+            </a:r>
+            <a:r>
+              <a:rPr lang="en-GB" sz="1200" b="0" i="0" kern="1200" dirty="0" smtClean="0">
+                <a:solidFill>
+                  <a:schemeClr val="tx1"/>
+                </a:solidFill>
+                <a:effectLst/>
+                <a:latin typeface="+mn-lt"/>
+                <a:ea typeface="+mn-ea"/>
+                <a:cs typeface="+mn-cs"/>
+              </a:rPr>
+              <a:t>IBEX </a:t>
+            </a:r>
+            <a:r>
+              <a:rPr lang="en-GB" sz="1200" b="0" i="0" kern="1200" dirty="0" smtClean="0">
+                <a:solidFill>
+                  <a:schemeClr val="tx1"/>
+                </a:solidFill>
+                <a:effectLst/>
+                <a:latin typeface="+mn-lt"/>
+                <a:ea typeface="+mn-ea"/>
+                <a:cs typeface="+mn-cs"/>
+              </a:rPr>
+              <a:t>client </a:t>
             </a:r>
           </a:p>
           <a:p>
@@ -5625,7 +5754,7 @@
               <a:pPr>
                 <a:defRPr/>
               </a:pPr>
-              <a:t>18/07/2017</a:t>
+              <a:t>19/07/2017</a:t>
             </a:fld>
             <a:endParaRPr lang="en-GB" dirty="0"/>
           </a:p>
@@ -5822,7 +5951,7 @@
               <a:pPr>
                 <a:defRPr/>
               </a:pPr>
-              <a:t>18/07/2017</a:t>
+              <a:t>19/07/2017</a:t>
             </a:fld>
             <a:endParaRPr lang="en-GB" dirty="0"/>
           </a:p>
@@ -6029,7 +6158,7 @@
               <a:pPr>
                 <a:defRPr/>
               </a:pPr>
-              <a:t>18/07/2017</a:t>
+              <a:t>19/07/2017</a:t>
             </a:fld>
             <a:endParaRPr lang="en-GB" dirty="0"/>
           </a:p>
@@ -6226,7 +6355,7 @@
               <a:pPr>
                 <a:defRPr/>
               </a:pPr>
-              <a:t>18/07/2017</a:t>
+              <a:t>19/07/2017</a:t>
             </a:fld>
             <a:endParaRPr lang="en-GB" dirty="0"/>
           </a:p>
@@ -6499,7 +6628,7 @@
               <a:pPr>
                 <a:defRPr/>
               </a:pPr>
-              <a:t>18/07/2017</a:t>
+              <a:t>19/07/2017</a:t>
             </a:fld>
             <a:endParaRPr lang="en-GB" dirty="0"/>
           </a:p>
@@ -6814,7 +6943,7 @@
               <a:pPr>
                 <a:defRPr/>
               </a:pPr>
-              <a:t>18/07/2017</a:t>
+              <a:t>19/07/2017</a:t>
             </a:fld>
             <a:endParaRPr lang="en-GB" dirty="0"/>
           </a:p>
@@ -7263,7 +7392,7 @@
               <a:pPr>
                 <a:defRPr/>
               </a:pPr>
-              <a:t>18/07/2017</a:t>
+              <a:t>19/07/2017</a:t>
             </a:fld>
             <a:endParaRPr lang="en-GB" dirty="0"/>
           </a:p>
@@ -7408,7 +7537,7 @@
               <a:pPr>
                 <a:defRPr/>
               </a:pPr>
-              <a:t>18/07/2017</a:t>
+              <a:t>19/07/2017</a:t>
             </a:fld>
             <a:endParaRPr lang="en-GB" dirty="0"/>
           </a:p>
@@ -7530,7 +7659,7 @@
               <a:pPr>
                 <a:defRPr/>
               </a:pPr>
-              <a:t>18/07/2017</a:t>
+              <a:t>19/07/2017</a:t>
             </a:fld>
             <a:endParaRPr lang="en-GB" dirty="0"/>
           </a:p>
@@ -7834,7 +7963,7 @@
               <a:pPr>
                 <a:defRPr/>
               </a:pPr>
-              <a:t>18/07/2017</a:t>
+              <a:t>19/07/2017</a:t>
             </a:fld>
             <a:endParaRPr lang="en-GB" dirty="0"/>
           </a:p>
@@ -8117,7 +8246,7 @@
               <a:pPr>
                 <a:defRPr/>
               </a:pPr>
-              <a:t>18/07/2017</a:t>
+              <a:t>19/07/2017</a:t>
             </a:fld>
             <a:endParaRPr lang="en-GB" dirty="0"/>
           </a:p>
@@ -8412,7 +8541,7 @@
               <a:pPr>
                 <a:defRPr/>
               </a:pPr>
-              <a:t>18/07/2017</a:t>
+              <a:t>19/07/2017</a:t>
             </a:fld>
             <a:endParaRPr lang="en-GB" dirty="0"/>
           </a:p>
@@ -9024,7 +9153,23 @@
                   <a:schemeClr val="tx1"/>
                 </a:solidFill>
               </a:rPr>
-              <a:t> and Ibex</a:t>
+              <a:t> and </a:t>
+            </a:r>
+            <a:r>
+              <a:rPr lang="en-GB" sz="3600" b="1" dirty="0" smtClean="0">
+                <a:solidFill>
+                  <a:schemeClr val="tx1"/>
+                </a:solidFill>
+              </a:rPr>
+              <a:t>IBEX</a:t>
+            </a:r>
+            <a:r>
+              <a:rPr lang="en-GB" sz="3600" b="1" dirty="0" smtClean="0">
+                <a:solidFill>
+                  <a:schemeClr val="tx1"/>
+                </a:solidFill>
+              </a:rPr>
+              <a:t/>
             </a:r>
             <a:br>
               <a:rPr lang="en-GB" sz="3600" b="1" dirty="0" smtClean="0">
@@ -9154,7 +9299,7 @@
       </p:sp>
       <p:pic>
         <p:nvPicPr>
-          <p:cNvPr id="1026" name="Picture 2"/>
+          <p:cNvPr id="3" name="Picture 2"/>
           <p:cNvPicPr>
             <a:picLocks noChangeAspect="1" noChangeArrowheads="1"/>
           </p:cNvPicPr>
@@ -9175,8 +9320,8 @@
         </p:blipFill>
         <p:spPr bwMode="auto">
           <a:xfrm>
-            <a:off x="1187624" y="1556792"/>
-            <a:ext cx="7349428" cy="4476353"/>
+            <a:off x="323528" y="1916832"/>
+            <a:ext cx="8532440" cy="3618187"/>
           </a:xfrm>
           <a:prstGeom prst="rect">
             <a:avLst/>
@@ -9442,27 +9587,7 @@
                 <a:latin typeface="Consolas" panose="020B0609020204030204" pitchFamily="49" charset="0"/>
                 <a:cs typeface="Consolas" panose="020B0609020204030204" pitchFamily="49" charset="0"/>
               </a:rPr>
-              <a:t>c</a:t>
-            </a:r>
-            <a:r>
-              <a:rPr lang="en-GB" sz="1400" dirty="0" err="1">
-                <a:solidFill>
-                  <a:schemeClr val="accent2"/>
-                </a:solidFill>
-                <a:latin typeface="Consolas" panose="020B0609020204030204" pitchFamily="49" charset="0"/>
-                <a:cs typeface="Consolas" panose="020B0609020204030204" pitchFamily="49" charset="0"/>
-              </a:rPr>
-              <a:t>se</a:t>
-            </a:r>
-            <a:r>
-              <a:rPr lang="en-GB" sz="1400" dirty="0" err="1">
-                <a:solidFill>
-                  <a:schemeClr val="accent2"/>
-                </a:solidFill>
-                <a:latin typeface="Consolas" panose="020B0609020204030204" pitchFamily="49" charset="0"/>
-                <a:cs typeface="Consolas" panose="020B0609020204030204" pitchFamily="49" charset="0"/>
-              </a:rPr>
-              <a:t>t</a:t>
+              <a:t>cset</a:t>
             </a:r>
             <a:r>
               <a:rPr lang="en-GB" sz="1400" dirty="0"/>
@@ -9631,17 +9756,7 @@
                 <a:latin typeface="Consolas" panose="020B0609020204030204" pitchFamily="49" charset="0"/>
                 <a:cs typeface="Consolas" panose="020B0609020204030204" pitchFamily="49" charset="0"/>
               </a:rPr>
-              <a:t>=True</a:t>
-            </a:r>
-            <a:r>
-              <a:rPr lang="en-GB" sz="1400" dirty="0">
-                <a:solidFill>
-                  <a:schemeClr val="accent2"/>
-                </a:solidFill>
-                <a:latin typeface="Consolas" panose="020B0609020204030204" pitchFamily="49" charset="0"/>
-                <a:cs typeface="Consolas" panose="020B0609020204030204" pitchFamily="49" charset="0"/>
-              </a:rPr>
-              <a:t>)</a:t>
+              <a:t>=True)</a:t>
             </a:r>
           </a:p>
           <a:p>
@@ -10225,27 +10340,7 @@
                 <a:latin typeface="Consolas" panose="020B0609020204030204" pitchFamily="49" charset="0"/>
                 <a:cs typeface="Consolas" panose="020B0609020204030204" pitchFamily="49" charset="0"/>
               </a:rPr>
-              <a:t>(“Adrian </a:t>
-            </a:r>
-            <a:r>
-              <a:rPr lang="en-GB" dirty="0">
-                <a:solidFill>
-                  <a:schemeClr val="accent2"/>
-                </a:solidFill>
-                <a:latin typeface="Consolas" panose="020B0609020204030204" pitchFamily="49" charset="0"/>
-                <a:cs typeface="Consolas" panose="020B0609020204030204" pitchFamily="49" charset="0"/>
-              </a:rPr>
-              <a:t>and John</a:t>
-            </a:r>
-            <a:r>
-              <a:rPr lang="en-GB" dirty="0">
-                <a:solidFill>
-                  <a:schemeClr val="accent2"/>
-                </a:solidFill>
-                <a:latin typeface="Consolas" panose="020B0609020204030204" pitchFamily="49" charset="0"/>
-                <a:cs typeface="Consolas" panose="020B0609020204030204" pitchFamily="49" charset="0"/>
-              </a:rPr>
-              <a:t>")</a:t>
+              <a:t>(“Adrian and John")</a:t>
             </a:r>
           </a:p>
           <a:p>
@@ -10989,7 +11084,7 @@
             </a:pPr>
             <a:r>
               <a:rPr lang="en-GB" dirty="0" smtClean="0"/>
-              <a:t>Ibex </a:t>
+              <a:t>IBEX </a:t>
             </a:r>
             <a:r>
               <a:rPr lang="en-GB" dirty="0"/>
@@ -11708,17 +11803,7 @@
                 <a:latin typeface="Consolas" panose="020B0609020204030204" pitchFamily="49" charset="0"/>
                 <a:cs typeface="Consolas" panose="020B0609020204030204" pitchFamily="49" charset="0"/>
               </a:rPr>
-              <a:t>('C:\script\my_script.py</a:t>
-            </a:r>
-            <a:r>
-              <a:rPr lang="en-GB" sz="2400" dirty="0">
-                <a:solidFill>
-                  <a:schemeClr val="accent2"/>
-                </a:solidFill>
-                <a:latin typeface="Consolas" panose="020B0609020204030204" pitchFamily="49" charset="0"/>
-                <a:cs typeface="Consolas" panose="020B0609020204030204" pitchFamily="49" charset="0"/>
-              </a:rPr>
-              <a:t>')</a:t>
+              <a:t>('C:\script\my_script.py')</a:t>
             </a:r>
           </a:p>
           <a:p>
@@ -11840,7 +11925,7 @@
         <p:spPr>
           <a:xfrm>
             <a:off x="395536" y="1844824"/>
-            <a:ext cx="8496944" cy="2677656"/>
+            <a:ext cx="8496944" cy="3046988"/>
           </a:xfrm>
           <a:prstGeom prst="rect">
             <a:avLst/>
@@ -11917,11 +12002,7 @@
             </a:r>
             <a:r>
               <a:rPr lang="en-GB" sz="2400" dirty="0" smtClean="0"/>
-              <a:t>, for </a:t>
-            </a:r>
-            <a:r>
-              <a:rPr lang="en-GB" sz="2400" dirty="0" smtClean="0"/>
-              <a:t>example:</a:t>
+              <a:t>, for example:</a:t>
             </a:r>
           </a:p>
           <a:p>
@@ -11949,13 +12030,6 @@
               </a:rPr>
               <a:t>("MY_BLOCK") </a:t>
             </a:r>
-            <a:endParaRPr lang="en-GB" sz="2400" dirty="0">
-              <a:solidFill>
-                <a:schemeClr val="accent2"/>
-              </a:solidFill>
-              <a:latin typeface="Consolas" panose="020B0609020204030204" pitchFamily="49" charset="0"/>
-              <a:cs typeface="Consolas" panose="020B0609020204030204" pitchFamily="49" charset="0"/>
-            </a:endParaRPr>
           </a:p>
           <a:p>
             <a:pPr marL="342900" indent="-342900">
@@ -11967,8 +12041,12 @@
               <a:t>The </a:t>
             </a:r>
             <a:r>
+              <a:rPr lang="en-GB" sz="2400" dirty="0" smtClean="0"/>
+              <a:t>IBEX </a:t>
+            </a:r>
+            <a:r>
               <a:rPr lang="en-GB" sz="2400" dirty="0"/>
-              <a:t>Ibex scripting perspective will provide auto-completion for instrument methods so you can see what is </a:t>
+              <a:t>scripting perspective will provide auto-completion for instrument methods so you can see what is </a:t>
             </a:r>
             <a:r>
               <a:rPr lang="en-GB" sz="2400" dirty="0" smtClean="0"/>
@@ -12127,8 +12205,8 @@
               <a:t>Converting from </a:t>
             </a:r>
             <a:r>
-              <a:rPr lang="en-GB" dirty="0" err="1" smtClean="0"/>
-              <a:t>OpenGENIE</a:t>
+              <a:rPr lang="en-GB" dirty="0" smtClean="0"/>
+              <a:t> Open GENIE</a:t>
             </a:r>
             <a:endParaRPr lang="en-GB" dirty="0" smtClean="0"/>
           </a:p>
@@ -13354,8 +13432,8 @@
               <a:t>Converting from </a:t>
             </a:r>
             <a:r>
-              <a:rPr lang="en-GB" dirty="0" err="1" smtClean="0"/>
-              <a:t>OpenGENIE</a:t>
+              <a:rPr lang="en-GB" dirty="0" smtClean="0"/>
+              <a:t> Open GENIE</a:t>
             </a:r>
             <a:r>
               <a:rPr lang="en-GB" dirty="0" smtClean="0"/>
@@ -13580,8 +13658,8 @@
               <a:t>Converting from </a:t>
             </a:r>
             <a:r>
-              <a:rPr lang="en-GB" dirty="0" err="1" smtClean="0"/>
-              <a:t>OpenGENIE</a:t>
+              <a:rPr lang="en-GB" dirty="0" smtClean="0"/>
+              <a:t> Open GENIE</a:t>
             </a:r>
             <a:r>
               <a:rPr lang="en-GB" dirty="0" smtClean="0"/>
@@ -13806,8 +13884,8 @@
               <a:t>Converting from </a:t>
             </a:r>
             <a:r>
-              <a:rPr lang="en-GB" dirty="0" err="1" smtClean="0"/>
-              <a:t>OpenGENIE</a:t>
+              <a:rPr lang="en-GB" dirty="0" smtClean="0"/>
+              <a:t> Open GENIE</a:t>
             </a:r>
             <a:r>
               <a:rPr lang="en-GB" dirty="0" smtClean="0"/>
@@ -14032,8 +14110,8 @@
               <a:t>Converting from </a:t>
             </a:r>
             <a:r>
-              <a:rPr lang="en-GB" dirty="0" err="1" smtClean="0"/>
-              <a:t>OpenGENIE</a:t>
+              <a:rPr lang="en-GB" dirty="0" smtClean="0"/>
+              <a:t> Open GENIE</a:t>
             </a:r>
             <a:r>
               <a:rPr lang="en-GB" dirty="0" smtClean="0"/>
@@ -14258,8 +14336,8 @@
               <a:t>Converting from </a:t>
             </a:r>
             <a:r>
-              <a:rPr lang="en-GB" dirty="0" err="1" smtClean="0"/>
-              <a:t>OpenGENIE</a:t>
+              <a:rPr lang="en-GB" dirty="0" smtClean="0"/>
+              <a:t> Open GENIE</a:t>
             </a:r>
             <a:r>
               <a:rPr lang="en-GB" dirty="0" smtClean="0"/>
@@ -14307,8 +14385,8 @@
               <a:t>The majority of </a:t>
             </a:r>
             <a:r>
-              <a:rPr lang="en-GB" dirty="0" err="1"/>
-              <a:t>OpenGENIE</a:t>
+              <a:rPr lang="en-GB" dirty="0" smtClean="0"/>
+              <a:t> Open GENIE</a:t>
             </a:r>
             <a:r>
               <a:rPr lang="en-GB" dirty="0"/>
@@ -14410,13 +14488,6 @@
               </a:rPr>
               <a:t>(“New title”)</a:t>
             </a:r>
-            <a:endParaRPr lang="en-GB" dirty="0">
-              <a:solidFill>
-                <a:schemeClr val="accent2"/>
-              </a:solidFill>
-              <a:latin typeface="Consolas" panose="020B0609020204030204" pitchFamily="49" charset="0"/>
-              <a:cs typeface="Consolas" panose="020B0609020204030204" pitchFamily="49" charset="0"/>
-            </a:endParaRPr>
           </a:p>
           <a:p>
             <a:pPr marL="342900" indent="-342900">
@@ -14436,12 +14507,8 @@
               <a:t> </a:t>
             </a:r>
             <a:r>
-              <a:rPr lang="en-GB" dirty="0" err="1" smtClean="0"/>
-              <a:t>OpenGENIE</a:t>
-            </a:r>
-            <a:r>
-              <a:rPr lang="en-GB" dirty="0"/>
-              <a:t> </a:t>
+              <a:rPr lang="en-GB" dirty="0" smtClean="0"/>
+              <a:t> Open GENIE </a:t>
             </a:r>
             <a:r>
               <a:rPr lang="en-GB" dirty="0" smtClean="0"/>
@@ -14473,17 +14540,7 @@
                 <a:latin typeface="Consolas" panose="020B0609020204030204" pitchFamily="49" charset="0"/>
                 <a:cs typeface="Consolas" panose="020B0609020204030204" pitchFamily="49" charset="0"/>
               </a:rPr>
-              <a:t>CSET/CONTROL TEMP1=5 LOWLIMIT=1 </a:t>
-            </a:r>
-            <a:r>
-              <a:rPr lang="en-GB" dirty="0">
-                <a:solidFill>
-                  <a:schemeClr val="accent4"/>
-                </a:solidFill>
-                <a:latin typeface="Consolas" panose="020B0609020204030204" pitchFamily="49" charset="0"/>
-                <a:cs typeface="Consolas" panose="020B0609020204030204" pitchFamily="49" charset="0"/>
-              </a:rPr>
-              <a:t>HIGHLIMIT=10</a:t>
+              <a:t>CSET/CONTROL TEMP1=5 LOWLIMIT=1 HIGHLIMIT=10</a:t>
             </a:r>
             <a:r>
               <a:rPr lang="en-GB" i="1" dirty="0" smtClean="0"/>
@@ -14633,8 +14690,8 @@
               <a:t>Converting from </a:t>
             </a:r>
             <a:r>
-              <a:rPr lang="en-GB" dirty="0" err="1" smtClean="0"/>
-              <a:t>OpenGENIE</a:t>
+              <a:rPr lang="en-GB" dirty="0" smtClean="0"/>
+              <a:t> Open GENIE</a:t>
             </a:r>
             <a:r>
               <a:rPr lang="en-GB" dirty="0" smtClean="0"/>
@@ -14810,15 +14867,7 @@
                   <a:srgbClr val="00B050"/>
                 </a:solidFill>
               </a:rPr>
-              <a:t>Tasks in </a:t>
-            </a:r>
-            <a:r>
-              <a:rPr lang="en-GB" i="1" dirty="0" smtClean="0">
-                <a:solidFill>
-                  <a:srgbClr val="00B050"/>
-                </a:solidFill>
-              </a:rPr>
-              <a:t>green</a:t>
+              <a:t>Tasks in green</a:t>
             </a:r>
           </a:p>
           <a:p>
@@ -14841,18 +14890,22 @@
           <a:p>
             <a:pPr lvl="1"/>
             <a:r>
-              <a:rPr lang="en-GB" dirty="0" err="1">
+              <a:rPr lang="en-GB" dirty="0" smtClean="0">
                 <a:solidFill>
                   <a:schemeClr val="accent4"/>
                 </a:solidFill>
                 <a:latin typeface="Consolas" panose="020B0609020204030204" pitchFamily="49" charset="0"/>
                 <a:cs typeface="Consolas" panose="020B0609020204030204" pitchFamily="49" charset="0"/>
               </a:rPr>
-              <a:t>OPENGenie</a:t>
+              <a:t> Open GENIE</a:t>
+            </a:r>
+            <a:r>
+              <a:rPr lang="en-GB" dirty="0" smtClean="0"/>
+              <a:t> </a:t>
             </a:r>
             <a:r>
               <a:rPr lang="en-GB" dirty="0"/>
-              <a:t> code is in purple</a:t>
+              <a:t>code is in purple</a:t>
             </a:r>
           </a:p>
           <a:p>
@@ -14942,8 +14995,8 @@
               <a:t>Converting from </a:t>
             </a:r>
             <a:r>
-              <a:rPr lang="en-GB" dirty="0" err="1" smtClean="0"/>
-              <a:t>OpenGENIE</a:t>
+              <a:rPr lang="en-GB" dirty="0" smtClean="0"/>
+              <a:t> Open GENIE</a:t>
             </a:r>
             <a:r>
               <a:rPr lang="en-GB" dirty="0" smtClean="0"/>
@@ -15079,8 +15132,8 @@
               <a:t>Converting from </a:t>
             </a:r>
             <a:r>
-              <a:rPr lang="en-GB" dirty="0" err="1" smtClean="0"/>
-              <a:t>OpenGENIE</a:t>
+              <a:rPr lang="en-GB" dirty="0" smtClean="0"/>
+              <a:t> Open GENIE</a:t>
             </a:r>
             <a:r>
               <a:rPr lang="en-GB" dirty="0" smtClean="0"/>
@@ -15261,7 +15314,7 @@
               <a:rPr lang="en-GB" sz="2000" u="sng" dirty="0" smtClean="0">
                 <a:hlinkClick r:id="rId4"/>
               </a:rPr>
-              <a:t>shadow.nd.rl.ac.uk/ibex_user_manual/Home</a:t>
+              <a:t>shadow.nd.rl.ac.uk/IBEX_user_manual/Home</a:t>
             </a:r>
             <a:endParaRPr lang="en-GB" sz="2000" u="sng" dirty="0"/>
           </a:p>
@@ -15279,7 +15332,19 @@
               <a:rPr lang="en-GB" sz="2000" u="sng" dirty="0">
                 <a:hlinkClick r:id="rId5"/>
               </a:rPr>
-              <a:t>http://shadow.nd.rl.ac.uk/ibex_user_manual/genie_python-and-Ibex-(Introduction</a:t>
+              <a:t>http://</a:t>
+            </a:r>
+            <a:r>
+              <a:rPr lang="en-GB" sz="2000" u="sng" dirty="0" smtClean="0">
+                <a:hlinkClick r:id="rId5"/>
+              </a:rPr>
+              <a:t>shadow.nd.rl.ac.uk/IBEX_user_manual/genie_python-and-IBEX-</a:t>
+            </a:r>
+            <a:r>
+              <a:rPr lang="en-GB" sz="2000" u="sng" dirty="0">
+                <a:hlinkClick r:id="rId5"/>
+              </a:rPr>
+              <a:t>(Introduction</a:t>
             </a:r>
             <a:r>
               <a:rPr lang="en-GB" sz="2000" u="sng" dirty="0" smtClean="0">
@@ -15469,8 +15534,21 @@
                   <a:srgbClr val="00B050"/>
                 </a:solidFill>
               </a:rPr>
-              <a:t>a scripting window in Ibex</a:t>
-            </a:r>
+              <a:t>a scripting window in </a:t>
+            </a:r>
+            <a:r>
+              <a:rPr lang="en-GB" i="1" dirty="0" smtClean="0">
+                <a:solidFill>
+                  <a:srgbClr val="00B050"/>
+                </a:solidFill>
+              </a:rPr>
+              <a:t>IBEX</a:t>
+            </a:r>
+            <a:endParaRPr lang="en-GB" i="1" dirty="0">
+              <a:solidFill>
+                <a:srgbClr val="00B050"/>
+              </a:solidFill>
+            </a:endParaRPr>
           </a:p>
           <a:p>
             <a:pPr marL="285750" indent="-285750">
@@ -15851,27 +15929,7 @@
                 <a:latin typeface="Consolas" panose="020B0609020204030204" pitchFamily="49" charset="0"/>
                 <a:cs typeface="Consolas" panose="020B0609020204030204" pitchFamily="49" charset="0"/>
               </a:rPr>
-              <a:t>(1</a:t>
-            </a:r>
-            <a:r>
-              <a:rPr lang="en-GB" sz="2400" dirty="0">
-                <a:solidFill>
-                  <a:schemeClr val="accent2"/>
-                </a:solidFill>
-                <a:latin typeface="Consolas" panose="020B0609020204030204" pitchFamily="49" charset="0"/>
-                <a:cs typeface="Consolas" panose="020B0609020204030204" pitchFamily="49" charset="0"/>
-              </a:rPr>
-              <a:t>, 2</a:t>
-            </a:r>
-            <a:r>
-              <a:rPr lang="en-GB" sz="2400" dirty="0">
-                <a:solidFill>
-                  <a:schemeClr val="accent2"/>
-                </a:solidFill>
-                <a:latin typeface="Consolas" panose="020B0609020204030204" pitchFamily="49" charset="0"/>
-                <a:cs typeface="Consolas" panose="020B0609020204030204" pitchFamily="49" charset="0"/>
-              </a:rPr>
-              <a:t>)</a:t>
+              <a:t>(1, 2)</a:t>
             </a:r>
           </a:p>
           <a:p>
@@ -15897,27 +15955,7 @@
                 <a:latin typeface="Consolas" panose="020B0609020204030204" pitchFamily="49" charset="0"/>
                 <a:cs typeface="Consolas" panose="020B0609020204030204" pitchFamily="49" charset="0"/>
               </a:rPr>
-              <a:t>(spectrum=1</a:t>
-            </a:r>
-            <a:r>
-              <a:rPr lang="en-GB" sz="2400" dirty="0">
-                <a:solidFill>
-                  <a:schemeClr val="accent2"/>
-                </a:solidFill>
-                <a:latin typeface="Consolas" panose="020B0609020204030204" pitchFamily="49" charset="0"/>
-                <a:cs typeface="Consolas" panose="020B0609020204030204" pitchFamily="49" charset="0"/>
-              </a:rPr>
-              <a:t>, period=2</a:t>
-            </a:r>
-            <a:r>
-              <a:rPr lang="en-GB" sz="2400" dirty="0">
-                <a:solidFill>
-                  <a:schemeClr val="accent2"/>
-                </a:solidFill>
-                <a:latin typeface="Consolas" panose="020B0609020204030204" pitchFamily="49" charset="0"/>
-                <a:cs typeface="Consolas" panose="020B0609020204030204" pitchFamily="49" charset="0"/>
-              </a:rPr>
-              <a:t>)</a:t>
+              <a:t>(spectrum=1, period=2)</a:t>
             </a:r>
           </a:p>
           <a:p>
@@ -15943,27 +15981,7 @@
                 <a:latin typeface="Consolas" panose="020B0609020204030204" pitchFamily="49" charset="0"/>
                 <a:cs typeface="Consolas" panose="020B0609020204030204" pitchFamily="49" charset="0"/>
               </a:rPr>
-              <a:t>(1</a:t>
-            </a:r>
-            <a:r>
-              <a:rPr lang="en-GB" sz="2400" dirty="0">
-                <a:solidFill>
-                  <a:schemeClr val="accent2"/>
-                </a:solidFill>
-                <a:latin typeface="Consolas" panose="020B0609020204030204" pitchFamily="49" charset="0"/>
-                <a:cs typeface="Consolas" panose="020B0609020204030204" pitchFamily="49" charset="0"/>
-              </a:rPr>
-              <a:t>, period=2</a:t>
-            </a:r>
-            <a:r>
-              <a:rPr lang="en-GB" sz="2400" dirty="0">
-                <a:solidFill>
-                  <a:schemeClr val="accent2"/>
-                </a:solidFill>
-                <a:latin typeface="Consolas" panose="020B0609020204030204" pitchFamily="49" charset="0"/>
-                <a:cs typeface="Consolas" panose="020B0609020204030204" pitchFamily="49" charset="0"/>
-              </a:rPr>
-              <a:t>)</a:t>
+              <a:t>(1, period=2)</a:t>
             </a:r>
           </a:p>
           <a:p>
@@ -15989,27 +16007,7 @@
                 <a:latin typeface="Consolas" panose="020B0609020204030204" pitchFamily="49" charset="0"/>
                 <a:cs typeface="Consolas" panose="020B0609020204030204" pitchFamily="49" charset="0"/>
               </a:rPr>
-              <a:t>(period=2</a:t>
-            </a:r>
-            <a:r>
-              <a:rPr lang="en-GB" sz="2400" dirty="0">
-                <a:solidFill>
-                  <a:schemeClr val="accent2"/>
-                </a:solidFill>
-                <a:latin typeface="Consolas" panose="020B0609020204030204" pitchFamily="49" charset="0"/>
-                <a:cs typeface="Consolas" panose="020B0609020204030204" pitchFamily="49" charset="0"/>
-              </a:rPr>
-              <a:t>, </a:t>
-            </a:r>
-            <a:r>
-              <a:rPr lang="en-GB" sz="2400" dirty="0">
-                <a:solidFill>
-                  <a:schemeClr val="accent2"/>
-                </a:solidFill>
-                <a:latin typeface="Consolas" panose="020B0609020204030204" pitchFamily="49" charset="0"/>
-                <a:cs typeface="Consolas" panose="020B0609020204030204" pitchFamily="49" charset="0"/>
-              </a:rPr>
-              <a:t>spectrum=1)</a:t>
+              <a:t>(period=2, spectrum=1)</a:t>
             </a:r>
           </a:p>
           <a:p>
@@ -16043,27 +16041,7 @@
                 <a:latin typeface="Consolas" panose="020B0609020204030204" pitchFamily="49" charset="0"/>
                 <a:cs typeface="Consolas" panose="020B0609020204030204" pitchFamily="49" charset="0"/>
               </a:rPr>
-              <a:t>(2</a:t>
-            </a:r>
-            <a:r>
-              <a:rPr lang="en-GB" sz="2400" dirty="0">
-                <a:solidFill>
-                  <a:schemeClr val="accent2"/>
-                </a:solidFill>
-                <a:latin typeface="Consolas" panose="020B0609020204030204" pitchFamily="49" charset="0"/>
-                <a:cs typeface="Consolas" panose="020B0609020204030204" pitchFamily="49" charset="0"/>
-              </a:rPr>
-              <a:t>, </a:t>
-            </a:r>
-            <a:r>
-              <a:rPr lang="en-GB" sz="2400" dirty="0">
-                <a:solidFill>
-                  <a:schemeClr val="accent2"/>
-                </a:solidFill>
-                <a:latin typeface="Consolas" panose="020B0609020204030204" pitchFamily="49" charset="0"/>
-                <a:cs typeface="Consolas" panose="020B0609020204030204" pitchFamily="49" charset="0"/>
-              </a:rPr>
-              <a:t>spectrum=1) </a:t>
+              <a:t>(2, spectrum=1) </a:t>
             </a:r>
             <a:r>
               <a:rPr lang="en-GB" sz="2400" dirty="0" smtClean="0">
@@ -16113,15 +16091,7 @@
                   <a:srgbClr val="00B050"/>
                 </a:solidFill>
               </a:rPr>
-              <a:t>? </a:t>
-            </a:r>
-            <a:r>
-              <a:rPr lang="en-GB" sz="2400" dirty="0" smtClean="0">
-                <a:solidFill>
-                  <a:srgbClr val="00B050"/>
-                </a:solidFill>
-              </a:rPr>
-              <a:t>Can you think of why you might choose each one?</a:t>
+              <a:t>? Can you think of why you might choose each one?</a:t>
             </a:r>
             <a:endParaRPr lang="en-GB" sz="2400" dirty="0" smtClean="0"/>
           </a:p>
@@ -16436,8 +16406,8 @@
         </p:nvSpPr>
         <p:spPr>
           <a:xfrm>
-            <a:off x="395536" y="1844824"/>
-            <a:ext cx="8496944" cy="4216539"/>
+            <a:off x="395536" y="1772816"/>
+            <a:ext cx="8496944" cy="4524315"/>
           </a:xfrm>
           <a:prstGeom prst="rect">
             <a:avLst/>
@@ -16592,37 +16562,17 @@
                 <a:latin typeface="Consolas" panose="020B0609020204030204" pitchFamily="49" charset="0"/>
                 <a:cs typeface="Consolas" panose="020B0609020204030204" pitchFamily="49" charset="0"/>
               </a:rPr>
-              <a:t>g</a:t>
-            </a:r>
-            <a:r>
-              <a:rPr lang="en-GB" sz="2400" dirty="0" err="1">
+              <a:t>g.waitfor_block</a:t>
+            </a:r>
+            <a:r>
+              <a:rPr lang="en-GB" sz="2400" dirty="0">
                 <a:solidFill>
                   <a:schemeClr val="accent2"/>
                 </a:solidFill>
                 <a:latin typeface="Consolas" panose="020B0609020204030204" pitchFamily="49" charset="0"/>
                 <a:cs typeface="Consolas" panose="020B0609020204030204" pitchFamily="49" charset="0"/>
               </a:rPr>
-              <a:t>.waitfor_block</a:t>
-            </a:r>
-            <a:r>
-              <a:rPr lang="en-GB" sz="2400" dirty="0">
-                <a:solidFill>
-                  <a:schemeClr val="accent2"/>
-                </a:solidFill>
-                <a:latin typeface="Consolas" panose="020B0609020204030204" pitchFamily="49" charset="0"/>
-                <a:cs typeface="Consolas" panose="020B0609020204030204" pitchFamily="49" charset="0"/>
-              </a:rPr>
-              <a:t>("</a:t>
-            </a:r>
-            <a:r>
-              <a:rPr lang="en-GB" sz="2400" dirty="0">
-                <a:solidFill>
-                  <a:schemeClr val="accent2"/>
-                </a:solidFill>
-                <a:latin typeface="Consolas" panose="020B0609020204030204" pitchFamily="49" charset="0"/>
-                <a:cs typeface="Consolas" panose="020B0609020204030204" pitchFamily="49" charset="0"/>
-              </a:rPr>
-              <a:t>MY_BLOCK", </a:t>
+              <a:t>("MY_BLOCK", </a:t>
             </a:r>
             <a:r>
               <a:rPr lang="en-GB" sz="2400" dirty="0" err="1">
@@ -16661,7 +16611,7 @@
               <a:t>g.waitfor_move</a:t>
             </a:r>
             <a:r>
-              <a:rPr lang="en-GB" sz="2400" dirty="0">
+              <a:rPr lang="en-GB" sz="2400" dirty="0" smtClean="0">
                 <a:solidFill>
                   <a:schemeClr val="accent2"/>
                 </a:solidFill>
@@ -16670,6 +16620,39 @@
               </a:rPr>
               <a:t>()</a:t>
             </a:r>
+          </a:p>
+          <a:p>
+            <a:pPr marL="800100" lvl="1" indent="-342900">
+              <a:buFont typeface="Arial" panose="020B0604020202020204" pitchFamily="34" charset="0"/>
+              <a:buChar char="•"/>
+            </a:pPr>
+            <a:r>
+              <a:rPr lang="en-GB" sz="2400" dirty="0" err="1" smtClean="0">
+                <a:solidFill>
+                  <a:schemeClr val="accent2"/>
+                </a:solidFill>
+                <a:latin typeface="Consolas" panose="020B0609020204030204" pitchFamily="49" charset="0"/>
+                <a:cs typeface="Consolas" panose="020B0609020204030204" pitchFamily="49" charset="0"/>
+              </a:rPr>
+              <a:t>g.waitfor_runstate</a:t>
+            </a:r>
+            <a:r>
+              <a:rPr lang="en-GB" sz="2400" dirty="0" smtClean="0">
+                <a:solidFill>
+                  <a:schemeClr val="accent2"/>
+                </a:solidFill>
+                <a:latin typeface="Consolas" panose="020B0609020204030204" pitchFamily="49" charset="0"/>
+                <a:cs typeface="Consolas" panose="020B0609020204030204" pitchFamily="49" charset="0"/>
+              </a:rPr>
+              <a:t>(“Running”, 60)</a:t>
+            </a:r>
+            <a:endParaRPr lang="en-GB" sz="2400" dirty="0">
+              <a:solidFill>
+                <a:schemeClr val="accent2"/>
+              </a:solidFill>
+              <a:latin typeface="Consolas" panose="020B0609020204030204" pitchFamily="49" charset="0"/>
+              <a:cs typeface="Consolas" panose="020B0609020204030204" pitchFamily="49" charset="0"/>
+            </a:endParaRPr>
           </a:p>
           <a:p>
             <a:pPr marL="342900" indent="-342900">

</xml_diff>

<commit_message>
Update slides with syntax fixes
</commit_message>
<xml_diff>
--- a/genie_python_and_ibex/genie_python_and_ibex.pptx
+++ b/genie_python_and_ibex/genie_python_and_ibex.pptx
@@ -253,7 +253,7 @@
           <a:p>
             <a:fld id="{0DA9C53C-B82A-4351-B1EF-A4391C7B86A2}" type="datetimeFigureOut">
               <a:rPr lang="en-GB" smtClean="0"/>
-              <a:t>19/07/2017</a:t>
+              <a:t>25/08/2017</a:t>
             </a:fld>
             <a:endParaRPr lang="en-GB" dirty="0"/>
           </a:p>
@@ -2400,31 +2400,7 @@
                 <a:ea typeface="+mn-ea"/>
                 <a:cs typeface="+mn-cs"/>
               </a:rPr>
-              <a:t> our old </a:t>
-            </a:r>
-            <a:r>
-              <a:rPr lang="en-GB" sz="1200" b="0" i="0" kern="1200" baseline="0" dirty="0" smtClean="0">
-                <a:solidFill>
-                  <a:schemeClr val="tx1"/>
-                </a:solidFill>
-                <a:effectLst/>
-                <a:latin typeface="+mn-lt"/>
-                <a:ea typeface="+mn-ea"/>
-                <a:cs typeface="+mn-cs"/>
-              </a:rPr>
-              <a:t> Open GENIE </a:t>
-            </a:r>
-            <a:r>
-              <a:rPr lang="en-GB" sz="1200" b="0" i="0" kern="1200" baseline="0" dirty="0" smtClean="0">
-                <a:solidFill>
-                  <a:schemeClr val="tx1"/>
-                </a:solidFill>
-                <a:effectLst/>
-                <a:latin typeface="+mn-lt"/>
-                <a:ea typeface="+mn-ea"/>
-                <a:cs typeface="+mn-cs"/>
-              </a:rPr>
-              <a:t>scripts to </a:t>
+              <a:t> our old  Open GENIE scripts to </a:t>
             </a:r>
             <a:r>
               <a:rPr lang="en-GB" sz="1200" b="0" i="0" kern="1200" baseline="0" dirty="0" err="1" smtClean="0">
@@ -2987,15 +2963,7 @@
             </a:pPr>
             <a:r>
               <a:rPr lang="en-GB" b="0" dirty="0" smtClean="0"/>
-              <a:t>See https://</a:t>
-            </a:r>
-            <a:r>
-              <a:rPr lang="en-GB" b="0" dirty="0" smtClean="0"/>
-              <a:t>github.com/ISISComputingGroup/IBEX_user_manual/wiki/genie_python-and-IBEX-</a:t>
-            </a:r>
-            <a:r>
-              <a:rPr lang="en-GB" b="0" dirty="0" smtClean="0"/>
-              <a:t>%28Exercise-solutions%29</a:t>
+              <a:t>See https://github.com/ISISComputingGroup/IBEX_user_manual/wiki/genie_python-and-IBEX-%28Exercise-solutions%29</a:t>
             </a:r>
           </a:p>
         </p:txBody>
@@ -3717,21 +3685,8 @@
             </a:pPr>
             <a:r>
               <a:rPr lang="en-GB" b="0" dirty="0" smtClean="0"/>
-              <a:t>https://</a:t>
-            </a:r>
-            <a:r>
-              <a:rPr lang="en-GB" b="0" dirty="0" smtClean="0"/>
-              <a:t>github.com/ISISComputingGroup/IBEX_user_manual/wiki/genie_python-and-IBEX-</a:t>
-            </a:r>
-            <a:r>
-              <a:rPr lang="en-GB" b="0" dirty="0" smtClean="0"/>
-              <a:t>%</a:t>
-            </a:r>
-            <a:r>
-              <a:rPr lang="en-GB" b="0" dirty="0" smtClean="0"/>
-              <a:t>28Converting-from- Open GENIE%29</a:t>
-            </a:r>
-            <a:endParaRPr lang="en-GB" b="0" dirty="0" smtClean="0"/>
+              <a:t>https://github.com/ISISComputingGroup/IBEX_user_manual/wiki/genie_python-and-IBEX-%28Converting-from- Open GENIE%29</a:t>
+            </a:r>
           </a:p>
         </p:txBody>
       </p:sp>
@@ -4089,43 +4044,7 @@
                 <a:ea typeface="+mn-ea"/>
                 <a:cs typeface="+mn-cs"/>
               </a:rPr>
-              <a:t>Full conversion steps at: https://</a:t>
-            </a:r>
-            <a:r>
-              <a:rPr lang="en-GB" sz="1200" b="0" i="0" kern="1200" dirty="0" smtClean="0">
-                <a:solidFill>
-                  <a:schemeClr val="tx1"/>
-                </a:solidFill>
-                <a:effectLst/>
-                <a:latin typeface="+mn-lt"/>
-                <a:ea typeface="+mn-ea"/>
-                <a:cs typeface="+mn-cs"/>
-              </a:rPr>
-              <a:t>github.com/ISISComputingGroup/IBEX_user_manual/wiki/genie_python-and-IBEX-</a:t>
-            </a:r>
-            <a:r>
-              <a:rPr lang="en-GB" sz="1200" b="0" i="0" kern="1200" dirty="0" smtClean="0">
-                <a:solidFill>
-                  <a:schemeClr val="tx1"/>
-                </a:solidFill>
-                <a:effectLst/>
-                <a:latin typeface="+mn-lt"/>
-                <a:ea typeface="+mn-ea"/>
-                <a:cs typeface="+mn-cs"/>
-              </a:rPr>
-              <a:t>%</a:t>
-            </a:r>
-            <a:r>
-              <a:rPr lang="en-GB" sz="1200" b="0" i="0" kern="1200" dirty="0" smtClean="0">
-                <a:solidFill>
-                  <a:schemeClr val="tx1"/>
-                </a:solidFill>
-                <a:effectLst/>
-                <a:latin typeface="+mn-lt"/>
-                <a:ea typeface="+mn-ea"/>
-                <a:cs typeface="+mn-cs"/>
-              </a:rPr>
-              <a:t>28Converting-from- Open GENIE%29</a:t>
+              <a:t>Full conversion steps at: https://github.com/ISISComputingGroup/IBEX_user_manual/wiki/genie_python-and-IBEX-%28Converting-from- Open GENIE%29</a:t>
             </a:r>
             <a:endParaRPr lang="en-GB" sz="1200" b="0" i="0" kern="1200" dirty="0">
               <a:solidFill>
@@ -4233,31 +4152,7 @@
                 <a:ea typeface="+mn-ea"/>
                 <a:cs typeface="+mn-cs"/>
               </a:rPr>
-              <a:t>https://</a:t>
-            </a:r>
-            <a:r>
-              <a:rPr lang="en-GB" sz="1200" b="0" i="0" kern="1200" dirty="0" smtClean="0">
-                <a:solidFill>
-                  <a:schemeClr val="tx1"/>
-                </a:solidFill>
-                <a:effectLst/>
-                <a:latin typeface="+mn-lt"/>
-                <a:ea typeface="+mn-ea"/>
-                <a:cs typeface="+mn-cs"/>
-              </a:rPr>
-              <a:t>github.com/ISISComputingGroup/IBEX_user_manual/wiki/genie_python-and-IBEX-</a:t>
-            </a:r>
-            <a:r>
-              <a:rPr lang="en-GB" sz="1200" b="0" i="0" kern="1200" dirty="0" smtClean="0">
-                <a:solidFill>
-                  <a:schemeClr val="tx1"/>
-                </a:solidFill>
-                <a:effectLst/>
-                <a:latin typeface="+mn-lt"/>
-                <a:ea typeface="+mn-ea"/>
-                <a:cs typeface="+mn-cs"/>
-              </a:rPr>
-              <a:t>%28Exercise-solutions%29</a:t>
+              <a:t>https://github.com/ISISComputingGroup/IBEX_user_manual/wiki/genie_python-and-IBEX-%28Exercise-solutions%29</a:t>
             </a:r>
           </a:p>
           <a:p>
@@ -4541,8 +4436,14 @@
                 <a:ea typeface="+mn-ea"/>
                 <a:cs typeface="+mn-cs"/>
               </a:rPr>
-              <a:t> commands is from the scripting perspective of the </a:t>
-            </a:r>
+              <a:t> commands is from the scripting perspective of the IBEX client.</a:t>
+            </a:r>
+          </a:p>
+          <a:p>
+            <a:pPr marL="171450" indent="-171450">
+              <a:buFontTx/>
+              <a:buChar char="-"/>
+            </a:pPr>
             <a:r>
               <a:rPr lang="en-GB" sz="1200" b="0" i="0" kern="1200" dirty="0" smtClean="0">
                 <a:solidFill>
@@ -4553,8 +4454,14 @@
                 <a:ea typeface="+mn-ea"/>
                 <a:cs typeface="+mn-cs"/>
               </a:rPr>
-              <a:t>IBEX </a:t>
-            </a:r>
+              <a:t>To open a scripting window:</a:t>
+            </a:r>
+          </a:p>
+          <a:p>
+            <a:pPr marL="628650" lvl="1" indent="-171450">
+              <a:buFontTx/>
+              <a:buChar char="-"/>
+            </a:pPr>
             <a:r>
               <a:rPr lang="en-GB" sz="1200" b="0" i="0" kern="1200" dirty="0" smtClean="0">
                 <a:solidFill>
@@ -4565,67 +4472,7 @@
                 <a:ea typeface="+mn-ea"/>
                 <a:cs typeface="+mn-cs"/>
               </a:rPr>
-              <a:t>client.</a:t>
-            </a:r>
-          </a:p>
-          <a:p>
-            <a:pPr marL="171450" indent="-171450">
-              <a:buFontTx/>
-              <a:buChar char="-"/>
-            </a:pPr>
-            <a:r>
-              <a:rPr lang="en-GB" sz="1200" b="0" i="0" kern="1200" dirty="0" smtClean="0">
-                <a:solidFill>
-                  <a:schemeClr val="tx1"/>
-                </a:solidFill>
-                <a:effectLst/>
-                <a:latin typeface="+mn-lt"/>
-                <a:ea typeface="+mn-ea"/>
-                <a:cs typeface="+mn-cs"/>
-              </a:rPr>
-              <a:t>To open a scripting window:</a:t>
-            </a:r>
-          </a:p>
-          <a:p>
-            <a:pPr marL="628650" lvl="1" indent="-171450">
-              <a:buFontTx/>
-              <a:buChar char="-"/>
-            </a:pPr>
-            <a:r>
-              <a:rPr lang="en-GB" sz="1200" b="0" i="0" kern="1200" dirty="0" smtClean="0">
-                <a:solidFill>
-                  <a:schemeClr val="tx1"/>
-                </a:solidFill>
-                <a:effectLst/>
-                <a:latin typeface="+mn-lt"/>
-                <a:ea typeface="+mn-ea"/>
-                <a:cs typeface="+mn-cs"/>
-              </a:rPr>
-              <a:t>Start the </a:t>
-            </a:r>
-            <a:r>
-              <a:rPr lang="en-GB" sz="1200" b="0" i="0" kern="1200" dirty="0" smtClean="0">
-                <a:solidFill>
-                  <a:schemeClr val="tx1"/>
-                </a:solidFill>
-                <a:effectLst/>
-                <a:latin typeface="+mn-lt"/>
-                <a:ea typeface="+mn-ea"/>
-                <a:cs typeface="+mn-cs"/>
-              </a:rPr>
-              <a:t>IBEX </a:t>
-            </a:r>
-            <a:r>
-              <a:rPr lang="en-GB" sz="1200" b="0" i="0" kern="1200" dirty="0" smtClean="0">
-                <a:solidFill>
-                  <a:schemeClr val="tx1"/>
-                </a:solidFill>
-                <a:effectLst/>
-                <a:latin typeface="+mn-lt"/>
-                <a:ea typeface="+mn-ea"/>
-                <a:cs typeface="+mn-cs"/>
-              </a:rPr>
-              <a:t>client </a:t>
+              <a:t>Start the IBEX client </a:t>
             </a:r>
           </a:p>
           <a:p>
@@ -5754,7 +5601,7 @@
               <a:pPr>
                 <a:defRPr/>
               </a:pPr>
-              <a:t>19/07/2017</a:t>
+              <a:t>25/08/2017</a:t>
             </a:fld>
             <a:endParaRPr lang="en-GB" dirty="0"/>
           </a:p>
@@ -5951,7 +5798,7 @@
               <a:pPr>
                 <a:defRPr/>
               </a:pPr>
-              <a:t>19/07/2017</a:t>
+              <a:t>25/08/2017</a:t>
             </a:fld>
             <a:endParaRPr lang="en-GB" dirty="0"/>
           </a:p>
@@ -6158,7 +6005,7 @@
               <a:pPr>
                 <a:defRPr/>
               </a:pPr>
-              <a:t>19/07/2017</a:t>
+              <a:t>25/08/2017</a:t>
             </a:fld>
             <a:endParaRPr lang="en-GB" dirty="0"/>
           </a:p>
@@ -6355,7 +6202,7 @@
               <a:pPr>
                 <a:defRPr/>
               </a:pPr>
-              <a:t>19/07/2017</a:t>
+              <a:t>25/08/2017</a:t>
             </a:fld>
             <a:endParaRPr lang="en-GB" dirty="0"/>
           </a:p>
@@ -6628,7 +6475,7 @@
               <a:pPr>
                 <a:defRPr/>
               </a:pPr>
-              <a:t>19/07/2017</a:t>
+              <a:t>25/08/2017</a:t>
             </a:fld>
             <a:endParaRPr lang="en-GB" dirty="0"/>
           </a:p>
@@ -6943,7 +6790,7 @@
               <a:pPr>
                 <a:defRPr/>
               </a:pPr>
-              <a:t>19/07/2017</a:t>
+              <a:t>25/08/2017</a:t>
             </a:fld>
             <a:endParaRPr lang="en-GB" dirty="0"/>
           </a:p>
@@ -7392,7 +7239,7 @@
               <a:pPr>
                 <a:defRPr/>
               </a:pPr>
-              <a:t>19/07/2017</a:t>
+              <a:t>25/08/2017</a:t>
             </a:fld>
             <a:endParaRPr lang="en-GB" dirty="0"/>
           </a:p>
@@ -7537,7 +7384,7 @@
               <a:pPr>
                 <a:defRPr/>
               </a:pPr>
-              <a:t>19/07/2017</a:t>
+              <a:t>25/08/2017</a:t>
             </a:fld>
             <a:endParaRPr lang="en-GB" dirty="0"/>
           </a:p>
@@ -7659,7 +7506,7 @@
               <a:pPr>
                 <a:defRPr/>
               </a:pPr>
-              <a:t>19/07/2017</a:t>
+              <a:t>25/08/2017</a:t>
             </a:fld>
             <a:endParaRPr lang="en-GB" dirty="0"/>
           </a:p>
@@ -7963,7 +7810,7 @@
               <a:pPr>
                 <a:defRPr/>
               </a:pPr>
-              <a:t>19/07/2017</a:t>
+              <a:t>25/08/2017</a:t>
             </a:fld>
             <a:endParaRPr lang="en-GB" dirty="0"/>
           </a:p>
@@ -8246,7 +8093,7 @@
               <a:pPr>
                 <a:defRPr/>
               </a:pPr>
-              <a:t>19/07/2017</a:t>
+              <a:t>25/08/2017</a:t>
             </a:fld>
             <a:endParaRPr lang="en-GB" dirty="0"/>
           </a:p>
@@ -8541,7 +8388,7 @@
               <a:pPr>
                 <a:defRPr/>
               </a:pPr>
-              <a:t>19/07/2017</a:t>
+              <a:t>25/08/2017</a:t>
             </a:fld>
             <a:endParaRPr lang="en-GB" dirty="0"/>
           </a:p>
@@ -9153,23 +9000,7 @@
                   <a:schemeClr val="tx1"/>
                 </a:solidFill>
               </a:rPr>
-              <a:t> and </a:t>
-            </a:r>
-            <a:r>
-              <a:rPr lang="en-GB" sz="3600" b="1" dirty="0" smtClean="0">
-                <a:solidFill>
-                  <a:schemeClr val="tx1"/>
-                </a:solidFill>
-              </a:rPr>
-              <a:t>IBEX</a:t>
-            </a:r>
-            <a:r>
-              <a:rPr lang="en-GB" sz="3600" b="1" dirty="0" smtClean="0">
-                <a:solidFill>
-                  <a:schemeClr val="tx1"/>
-                </a:solidFill>
-              </a:rPr>
-              <a:t/>
+              <a:t> and IBEX</a:t>
             </a:r>
             <a:br>
               <a:rPr lang="en-GB" sz="3600" b="1" dirty="0" smtClean="0">
@@ -9299,7 +9130,7 @@
       </p:sp>
       <p:pic>
         <p:nvPicPr>
-          <p:cNvPr id="3" name="Picture 2"/>
+          <p:cNvPr id="1026" name="Picture 2"/>
           <p:cNvPicPr>
             <a:picLocks noChangeAspect="1" noChangeArrowheads="1"/>
           </p:cNvPicPr>
@@ -9320,8 +9151,8 @@
         </p:blipFill>
         <p:spPr bwMode="auto">
           <a:xfrm>
-            <a:off x="323528" y="1916832"/>
-            <a:ext cx="8532440" cy="3618187"/>
+            <a:off x="179512" y="1916832"/>
+            <a:ext cx="8748464" cy="3751652"/>
           </a:xfrm>
           <a:prstGeom prst="rect">
             <a:avLst/>
@@ -12038,11 +11869,7 @@
             </a:pPr>
             <a:r>
               <a:rPr lang="en-GB" sz="2400" dirty="0" smtClean="0"/>
-              <a:t>The </a:t>
-            </a:r>
-            <a:r>
-              <a:rPr lang="en-GB" sz="2400" dirty="0" smtClean="0"/>
-              <a:t>IBEX </a:t>
+              <a:t>The IBEX </a:t>
             </a:r>
             <a:r>
               <a:rPr lang="en-GB" sz="2400" dirty="0"/>
@@ -12202,13 +12029,8 @@
           <a:p>
             <a:r>
               <a:rPr lang="en-GB" dirty="0" smtClean="0"/>
-              <a:t>Converting from </a:t>
-            </a:r>
-            <a:r>
-              <a:rPr lang="en-GB" dirty="0" smtClean="0"/>
-              <a:t> Open GENIE</a:t>
-            </a:r>
-            <a:endParaRPr lang="en-GB" dirty="0" smtClean="0"/>
+              <a:t>Converting from  Open GENIE</a:t>
+            </a:r>
           </a:p>
         </p:txBody>
       </p:sp>
@@ -13429,15 +13251,7 @@
           <a:p>
             <a:r>
               <a:rPr lang="en-GB" dirty="0" smtClean="0"/>
-              <a:t>Converting from </a:t>
-            </a:r>
-            <a:r>
-              <a:rPr lang="en-GB" dirty="0" smtClean="0"/>
-              <a:t> Open GENIE</a:t>
-            </a:r>
-            <a:r>
-              <a:rPr lang="en-GB" dirty="0" smtClean="0"/>
-              <a:t/>
+              <a:t>Converting from  Open GENIE</a:t>
             </a:r>
             <a:br>
               <a:rPr lang="en-GB" dirty="0" smtClean="0"/>
@@ -13655,15 +13469,7 @@
           <a:p>
             <a:r>
               <a:rPr lang="en-GB" dirty="0" smtClean="0"/>
-              <a:t>Converting from </a:t>
-            </a:r>
-            <a:r>
-              <a:rPr lang="en-GB" dirty="0" smtClean="0"/>
-              <a:t> Open GENIE</a:t>
-            </a:r>
-            <a:r>
-              <a:rPr lang="en-GB" dirty="0" smtClean="0"/>
-              <a:t/>
+              <a:t>Converting from  Open GENIE</a:t>
             </a:r>
             <a:br>
               <a:rPr lang="en-GB" dirty="0" smtClean="0"/>
@@ -13881,15 +13687,7 @@
           <a:p>
             <a:r>
               <a:rPr lang="en-GB" dirty="0" smtClean="0"/>
-              <a:t>Converting from </a:t>
-            </a:r>
-            <a:r>
-              <a:rPr lang="en-GB" dirty="0" smtClean="0"/>
-              <a:t> Open GENIE</a:t>
-            </a:r>
-            <a:r>
-              <a:rPr lang="en-GB" dirty="0" smtClean="0"/>
-              <a:t/>
+              <a:t>Converting from  Open GENIE</a:t>
             </a:r>
             <a:br>
               <a:rPr lang="en-GB" dirty="0" smtClean="0"/>
@@ -14107,15 +13905,7 @@
           <a:p>
             <a:r>
               <a:rPr lang="en-GB" dirty="0" smtClean="0"/>
-              <a:t>Converting from </a:t>
-            </a:r>
-            <a:r>
-              <a:rPr lang="en-GB" dirty="0" smtClean="0"/>
-              <a:t> Open GENIE</a:t>
-            </a:r>
-            <a:r>
-              <a:rPr lang="en-GB" dirty="0" smtClean="0"/>
-              <a:t/>
+              <a:t>Converting from  Open GENIE</a:t>
             </a:r>
             <a:br>
               <a:rPr lang="en-GB" dirty="0" smtClean="0"/>
@@ -14333,15 +14123,7 @@
           <a:p>
             <a:r>
               <a:rPr lang="en-GB" dirty="0" smtClean="0"/>
-              <a:t>Converting from </a:t>
-            </a:r>
-            <a:r>
-              <a:rPr lang="en-GB" dirty="0" smtClean="0"/>
-              <a:t> Open GENIE</a:t>
-            </a:r>
-            <a:r>
-              <a:rPr lang="en-GB" dirty="0" smtClean="0"/>
-              <a:t/>
+              <a:t>Converting from  Open GENIE</a:t>
             </a:r>
             <a:br>
               <a:rPr lang="en-GB" dirty="0" smtClean="0"/>
@@ -14508,11 +14290,7 @@
             </a:r>
             <a:r>
               <a:rPr lang="en-GB" dirty="0" smtClean="0"/>
-              <a:t> Open GENIE </a:t>
-            </a:r>
-            <a:r>
-              <a:rPr lang="en-GB" dirty="0" smtClean="0"/>
-              <a:t>and</a:t>
+              <a:t> Open GENIE and</a:t>
             </a:r>
             <a:r>
               <a:rPr lang="en-GB" dirty="0"/>
@@ -14687,15 +14465,7 @@
           <a:p>
             <a:r>
               <a:rPr lang="en-GB" dirty="0" smtClean="0"/>
-              <a:t>Converting from </a:t>
-            </a:r>
-            <a:r>
-              <a:rPr lang="en-GB" dirty="0" smtClean="0"/>
-              <a:t> Open GENIE</a:t>
-            </a:r>
-            <a:r>
-              <a:rPr lang="en-GB" dirty="0" smtClean="0"/>
-              <a:t/>
+              <a:t>Converting from  Open GENIE</a:t>
             </a:r>
             <a:br>
               <a:rPr lang="en-GB" dirty="0" smtClean="0"/>
@@ -14992,15 +14762,7 @@
           <a:p>
             <a:r>
               <a:rPr lang="en-GB" dirty="0" smtClean="0"/>
-              <a:t>Converting from </a:t>
-            </a:r>
-            <a:r>
-              <a:rPr lang="en-GB" dirty="0" smtClean="0"/>
-              <a:t> Open GENIE</a:t>
-            </a:r>
-            <a:r>
-              <a:rPr lang="en-GB" dirty="0" smtClean="0"/>
-              <a:t/>
+              <a:t>Converting from  Open GENIE</a:t>
             </a:r>
             <a:br>
               <a:rPr lang="en-GB" dirty="0" smtClean="0"/>
@@ -15129,15 +14891,7 @@
           <a:p>
             <a:r>
               <a:rPr lang="en-GB" dirty="0" smtClean="0"/>
-              <a:t>Converting from </a:t>
-            </a:r>
-            <a:r>
-              <a:rPr lang="en-GB" dirty="0" smtClean="0"/>
-              <a:t> Open GENIE</a:t>
-            </a:r>
-            <a:r>
-              <a:rPr lang="en-GB" dirty="0" smtClean="0"/>
-              <a:t/>
+              <a:t>Converting from  Open GENIE</a:t>
             </a:r>
             <a:br>
               <a:rPr lang="en-GB" dirty="0" smtClean="0"/>
@@ -16073,7 +15827,7 @@
                 <a:latin typeface="Consolas" panose="020B0609020204030204" pitchFamily="49" charset="0"/>
                 <a:cs typeface="Consolas" panose="020B0609020204030204" pitchFamily="49" charset="0"/>
               </a:rPr>
-              <a:t>g.begin</a:t>
+              <a:t>g.end</a:t>
             </a:r>
             <a:r>
               <a:rPr lang="en-GB" sz="2400" dirty="0" smtClean="0">
@@ -16083,7 +15837,17 @@
                 <a:latin typeface="Consolas" panose="020B0609020204030204" pitchFamily="49" charset="0"/>
                 <a:cs typeface="Consolas" panose="020B0609020204030204" pitchFamily="49" charset="0"/>
               </a:rPr>
-              <a:t>(False)</a:t>
+              <a:t>(False</a:t>
+            </a:r>
+            <a:r>
+              <a:rPr lang="en-GB" sz="2400" dirty="0" smtClean="0">
+                <a:solidFill>
+                  <a:schemeClr val="accent2"/>
+                </a:solidFill>
+                <a:latin typeface="Consolas" panose="020B0609020204030204" pitchFamily="49" charset="0"/>
+                <a:cs typeface="Consolas" panose="020B0609020204030204" pitchFamily="49" charset="0"/>
+              </a:rPr>
+              <a:t>)</a:t>
             </a:r>
             <a:r>
               <a:rPr lang="en-GB" sz="2400" dirty="0" smtClean="0">
@@ -17520,6 +17284,21 @@
 </file>
 
 <file path=customXml/item1.xml><?xml version="1.0" encoding="utf-8"?>
+<?mso-contentType ?>
+<FormTemplates xmlns="http://schemas.microsoft.com/sharepoint/v3/contenttype/forms">
+  <Display>DocumentLibraryForm</Display>
+  <Edit>DocumentLibraryForm</Edit>
+  <New>DocumentLibraryForm</New>
+</FormTemplates>
+</file>
+
+<file path=customXml/item2.xml><?xml version="1.0" encoding="utf-8"?>
+<p:properties xmlns:p="http://schemas.microsoft.com/office/2006/metadata/properties" xmlns:xsi="http://www.w3.org/2001/XMLSchema-instance" xmlns:pc="http://schemas.microsoft.com/office/infopath/2007/PartnerControls">
+  <documentManagement/>
+</p:properties>
+</file>
+
+<file path=customXml/item3.xml><?xml version="1.0" encoding="utf-8"?>
 <ct:contentTypeSchema xmlns:ct="http://schemas.microsoft.com/office/2006/metadata/contentType" xmlns:ma="http://schemas.microsoft.com/office/2006/metadata/properties/metaAttributes" ct:_="" ma:_="" ma:contentTypeName="Document" ma:contentTypeID="0x010100D8BDAAA291872E4C9CBDBAE9DC1F214B" ma:contentTypeVersion="0" ma:contentTypeDescription="Create a new document." ma:contentTypeScope="" ma:versionID="37718d931242bc0231cb88c3dc8184c7">
   <xsd:schema xmlns:xsd="http://www.w3.org/2001/XMLSchema" xmlns:xs="http://www.w3.org/2001/XMLSchema" xmlns:p="http://schemas.microsoft.com/office/2006/metadata/properties" targetNamespace="http://schemas.microsoft.com/office/2006/metadata/properties" ma:root="true" ma:fieldsID="8022916f55ab85163ee9a5069dec31d5">
     <xsd:element name="properties">
@@ -17633,33 +17412,10 @@
 </ct:contentTypeSchema>
 </file>
 
-<file path=customXml/item2.xml><?xml version="1.0" encoding="utf-8"?>
-<p:properties xmlns:p="http://schemas.microsoft.com/office/2006/metadata/properties" xmlns:xsi="http://www.w3.org/2001/XMLSchema-instance" xmlns:pc="http://schemas.microsoft.com/office/infopath/2007/PartnerControls">
-  <documentManagement/>
-</p:properties>
-</file>
-
-<file path=customXml/item3.xml><?xml version="1.0" encoding="utf-8"?>
-<?mso-contentType ?>
-<FormTemplates xmlns="http://schemas.microsoft.com/sharepoint/v3/contenttype/forms">
-  <Display>DocumentLibraryForm</Display>
-  <Edit>DocumentLibraryForm</Edit>
-  <New>DocumentLibraryForm</New>
-</FormTemplates>
-</file>
-
 <file path=customXml/itemProps1.xml><?xml version="1.0" encoding="utf-8"?>
-<ds:datastoreItem xmlns:ds="http://schemas.openxmlformats.org/officeDocument/2006/customXml" ds:itemID="{DD040A56-8D6F-4114-A272-42AE3B7D7ECA}">
+<ds:datastoreItem xmlns:ds="http://schemas.openxmlformats.org/officeDocument/2006/customXml" ds:itemID="{1D176834-956F-4505-BD61-698C091AD5AA}">
   <ds:schemaRefs>
-    <ds:schemaRef ds:uri="http://schemas.microsoft.com/office/2006/metadata/contentType"/>
-    <ds:schemaRef ds:uri="http://schemas.microsoft.com/office/2006/metadata/properties/metaAttributes"/>
-    <ds:schemaRef ds:uri="http://www.w3.org/2001/XMLSchema"/>
-    <ds:schemaRef ds:uri="http://schemas.microsoft.com/office/2006/metadata/properties"/>
-    <ds:schemaRef ds:uri="http://schemas.openxmlformats.org/package/2006/metadata/core-properties"/>
-    <ds:schemaRef ds:uri="http://purl.org/dc/elements/1.1/"/>
-    <ds:schemaRef ds:uri="http://purl.org/dc/terms/"/>
-    <ds:schemaRef ds:uri="http://schemas.microsoft.com/internal/obd"/>
-    <ds:schemaRef ds:uri="http://schemas.microsoft.com/office/infopath/2007/PartnerControls"/>
+    <ds:schemaRef ds:uri="http://schemas.microsoft.com/sharepoint/v3/contenttype/forms"/>
   </ds:schemaRefs>
 </ds:datastoreItem>
 </file>
@@ -17680,9 +17436,17 @@
 </file>
 
 <file path=customXml/itemProps3.xml><?xml version="1.0" encoding="utf-8"?>
-<ds:datastoreItem xmlns:ds="http://schemas.openxmlformats.org/officeDocument/2006/customXml" ds:itemID="{1D176834-956F-4505-BD61-698C091AD5AA}">
+<ds:datastoreItem xmlns:ds="http://schemas.openxmlformats.org/officeDocument/2006/customXml" ds:itemID="{DD040A56-8D6F-4114-A272-42AE3B7D7ECA}">
   <ds:schemaRefs>
-    <ds:schemaRef ds:uri="http://schemas.microsoft.com/sharepoint/v3/contenttype/forms"/>
+    <ds:schemaRef ds:uri="http://schemas.microsoft.com/office/2006/metadata/contentType"/>
+    <ds:schemaRef ds:uri="http://schemas.microsoft.com/office/2006/metadata/properties/metaAttributes"/>
+    <ds:schemaRef ds:uri="http://www.w3.org/2001/XMLSchema"/>
+    <ds:schemaRef ds:uri="http://schemas.microsoft.com/office/2006/metadata/properties"/>
+    <ds:schemaRef ds:uri="http://schemas.openxmlformats.org/package/2006/metadata/core-properties"/>
+    <ds:schemaRef ds:uri="http://purl.org/dc/elements/1.1/"/>
+    <ds:schemaRef ds:uri="http://purl.org/dc/terms/"/>
+    <ds:schemaRef ds:uri="http://schemas.microsoft.com/internal/obd"/>
+    <ds:schemaRef ds:uri="http://schemas.microsoft.com/office/infopath/2007/PartnerControls"/>
   </ds:schemaRefs>
 </ds:datastoreItem>
 </file>
</xml_diff>

<commit_message>
Update genie_python slides post September training
</commit_message>
<xml_diff>
--- a/genie_python_and_ibex/genie_python_and_ibex.pptx
+++ b/genie_python_and_ibex/genie_python_and_ibex.pptx
@@ -253,7 +253,7 @@
           <a:p>
             <a:fld id="{0DA9C53C-B82A-4351-B1EF-A4391C7B86A2}" type="datetimeFigureOut">
               <a:rPr lang="en-GB" smtClean="0"/>
-              <a:t>25/08/2017</a:t>
+              <a:t>15/09/2017</a:t>
             </a:fld>
             <a:endParaRPr lang="en-GB" dirty="0"/>
           </a:p>
@@ -4190,15 +4190,7 @@
             </a:r>
             <a:r>
               <a:rPr lang="en-GB" dirty="0" smtClean="0"/>
-              <a:t> = (start + </a:t>
-            </a:r>
-            <a:r>
-              <a:rPr lang="en-GB" dirty="0" err="1" smtClean="0"/>
-              <a:t>i</a:t>
-            </a:r>
-            <a:r>
-              <a:rPr lang="en-GB" dirty="0" smtClean="0"/>
-              <a:t>*</a:t>
+              <a:t> = (start + i*</a:t>
             </a:r>
             <a:r>
               <a:rPr lang="en-GB" dirty="0" err="1" smtClean="0"/>
@@ -4211,6 +4203,36 @@
             <a:r>
               <a:rPr lang="en-GB" baseline="0" dirty="0" smtClean="0"/>
               <a:t> needing to increment step size and do modulo in one step</a:t>
+            </a:r>
+          </a:p>
+          <a:p>
+            <a:pPr marL="171450" indent="-171450">
+              <a:buFont typeface="Arial" panose="020B0604020202020204" pitchFamily="34" charset="0"/>
+              <a:buChar char="•"/>
+            </a:pPr>
+            <a:r>
+              <a:rPr lang="en-GB" sz="1200" b="0" i="0" kern="1200" baseline="0" dirty="0" smtClean="0">
+                <a:solidFill>
+                  <a:schemeClr val="tx1"/>
+                </a:solidFill>
+                <a:effectLst/>
+                <a:latin typeface="+mn-lt"/>
+                <a:ea typeface="+mn-ea"/>
+                <a:cs typeface="+mn-cs"/>
+              </a:rPr>
+              <a:t>There is a mistake in the script people should spot. IF () OR </a:t>
+            </a:r>
+            <a:r>
+              <a:rPr lang="en-GB" sz="1200" b="0" i="0" kern="1200" baseline="0" smtClean="0">
+                <a:solidFill>
+                  <a:schemeClr val="tx1"/>
+                </a:solidFill>
+                <a:effectLst/>
+                <a:latin typeface="+mn-lt"/>
+                <a:ea typeface="+mn-ea"/>
+                <a:cs typeface="+mn-cs"/>
+              </a:rPr>
+              <a:t>() should be IF () AND ()</a:t>
             </a:r>
             <a:endParaRPr lang="en-GB" sz="1200" b="0" i="0" kern="1200" dirty="0">
               <a:solidFill>
@@ -5601,7 +5623,7 @@
               <a:pPr>
                 <a:defRPr/>
               </a:pPr>
-              <a:t>25/08/2017</a:t>
+              <a:t>15/09/2017</a:t>
             </a:fld>
             <a:endParaRPr lang="en-GB" dirty="0"/>
           </a:p>
@@ -5798,7 +5820,7 @@
               <a:pPr>
                 <a:defRPr/>
               </a:pPr>
-              <a:t>25/08/2017</a:t>
+              <a:t>15/09/2017</a:t>
             </a:fld>
             <a:endParaRPr lang="en-GB" dirty="0"/>
           </a:p>
@@ -6005,7 +6027,7 @@
               <a:pPr>
                 <a:defRPr/>
               </a:pPr>
-              <a:t>25/08/2017</a:t>
+              <a:t>15/09/2017</a:t>
             </a:fld>
             <a:endParaRPr lang="en-GB" dirty="0"/>
           </a:p>
@@ -6202,7 +6224,7 @@
               <a:pPr>
                 <a:defRPr/>
               </a:pPr>
-              <a:t>25/08/2017</a:t>
+              <a:t>15/09/2017</a:t>
             </a:fld>
             <a:endParaRPr lang="en-GB" dirty="0"/>
           </a:p>
@@ -6475,7 +6497,7 @@
               <a:pPr>
                 <a:defRPr/>
               </a:pPr>
-              <a:t>25/08/2017</a:t>
+              <a:t>15/09/2017</a:t>
             </a:fld>
             <a:endParaRPr lang="en-GB" dirty="0"/>
           </a:p>
@@ -6790,7 +6812,7 @@
               <a:pPr>
                 <a:defRPr/>
               </a:pPr>
-              <a:t>25/08/2017</a:t>
+              <a:t>15/09/2017</a:t>
             </a:fld>
             <a:endParaRPr lang="en-GB" dirty="0"/>
           </a:p>
@@ -7239,7 +7261,7 @@
               <a:pPr>
                 <a:defRPr/>
               </a:pPr>
-              <a:t>25/08/2017</a:t>
+              <a:t>15/09/2017</a:t>
             </a:fld>
             <a:endParaRPr lang="en-GB" dirty="0"/>
           </a:p>
@@ -7384,7 +7406,7 @@
               <a:pPr>
                 <a:defRPr/>
               </a:pPr>
-              <a:t>25/08/2017</a:t>
+              <a:t>15/09/2017</a:t>
             </a:fld>
             <a:endParaRPr lang="en-GB" dirty="0"/>
           </a:p>
@@ -7506,7 +7528,7 @@
               <a:pPr>
                 <a:defRPr/>
               </a:pPr>
-              <a:t>25/08/2017</a:t>
+              <a:t>15/09/2017</a:t>
             </a:fld>
             <a:endParaRPr lang="en-GB" dirty="0"/>
           </a:p>
@@ -7810,7 +7832,7 @@
               <a:pPr>
                 <a:defRPr/>
               </a:pPr>
-              <a:t>25/08/2017</a:t>
+              <a:t>15/09/2017</a:t>
             </a:fld>
             <a:endParaRPr lang="en-GB" dirty="0"/>
           </a:p>
@@ -8093,7 +8115,7 @@
               <a:pPr>
                 <a:defRPr/>
               </a:pPr>
-              <a:t>25/08/2017</a:t>
+              <a:t>15/09/2017</a:t>
             </a:fld>
             <a:endParaRPr lang="en-GB" dirty="0"/>
           </a:p>
@@ -8388,7 +8410,7 @@
               <a:pPr>
                 <a:defRPr/>
               </a:pPr>
-              <a:t>25/08/2017</a:t>
+              <a:t>15/09/2017</a:t>
             </a:fld>
             <a:endParaRPr lang="en-GB" dirty="0"/>
           </a:p>
@@ -9130,7 +9152,7 @@
       </p:sp>
       <p:pic>
         <p:nvPicPr>
-          <p:cNvPr id="1026" name="Picture 2"/>
+          <p:cNvPr id="1027" name="Picture 3"/>
           <p:cNvPicPr>
             <a:picLocks noChangeAspect="1" noChangeArrowheads="1"/>
           </p:cNvPicPr>
@@ -9151,8 +9173,8 @@
         </p:blipFill>
         <p:spPr bwMode="auto">
           <a:xfrm>
-            <a:off x="179512" y="1916832"/>
-            <a:ext cx="8748464" cy="3751652"/>
+            <a:off x="179512" y="1700808"/>
+            <a:ext cx="8839721" cy="3332208"/>
           </a:xfrm>
           <a:prstGeom prst="rect">
             <a:avLst/>
@@ -10441,7 +10463,7 @@
         <p:spPr>
           <a:xfrm>
             <a:off x="395536" y="1844824"/>
-            <a:ext cx="8496944" cy="3754874"/>
+            <a:ext cx="8496944" cy="4093428"/>
           </a:xfrm>
           <a:prstGeom prst="rect">
             <a:avLst/>
@@ -10703,8 +10725,31 @@
                   <a:srgbClr val="00B050"/>
                 </a:solidFill>
               </a:rPr>
-              <a:t>End the run</a:t>
-            </a:r>
+              <a:t>End the </a:t>
+            </a:r>
+            <a:r>
+              <a:rPr lang="en-GB" sz="2000" dirty="0" smtClean="0">
+                <a:solidFill>
+                  <a:srgbClr val="00B050"/>
+                </a:solidFill>
+              </a:rPr>
+              <a:t>run</a:t>
+            </a:r>
+          </a:p>
+          <a:p>
+            <a:r>
+              <a:rPr lang="en-GB" sz="2000" i="1" dirty="0" smtClean="0">
+                <a:solidFill>
+                  <a:srgbClr val="00B050"/>
+                </a:solidFill>
+              </a:rPr>
+              <a:t>[20 minutes]</a:t>
+            </a:r>
+            <a:endParaRPr lang="en-GB" sz="2000" i="1" dirty="0">
+              <a:solidFill>
+                <a:srgbClr val="00B050"/>
+              </a:solidFill>
+            </a:endParaRPr>
           </a:p>
         </p:txBody>
       </p:sp>
@@ -10788,7 +10833,7 @@
         <p:spPr>
           <a:xfrm>
             <a:off x="395536" y="1844824"/>
-            <a:ext cx="8496944" cy="4524315"/>
+            <a:ext cx="8496944" cy="4801314"/>
           </a:xfrm>
           <a:prstGeom prst="rect">
             <a:avLst/>
@@ -11096,8 +11141,31 @@
                   <a:srgbClr val="00B050"/>
                 </a:solidFill>
               </a:rPr>
-              <a:t> script called run_my_experiment.py</a:t>
-            </a:r>
+              <a:t> script called </a:t>
+            </a:r>
+            <a:r>
+              <a:rPr lang="en-GB" dirty="0" smtClean="0">
+                <a:solidFill>
+                  <a:srgbClr val="00B050"/>
+                </a:solidFill>
+              </a:rPr>
+              <a:t>run_my_experiment.py</a:t>
+            </a:r>
+          </a:p>
+          <a:p>
+            <a:r>
+              <a:rPr lang="en-GB" i="1" dirty="0" smtClean="0">
+                <a:solidFill>
+                  <a:srgbClr val="00B050"/>
+                </a:solidFill>
+              </a:rPr>
+              <a:t>[5 minutes]</a:t>
+            </a:r>
+            <a:endParaRPr lang="en-GB" i="1" dirty="0">
+              <a:solidFill>
+                <a:srgbClr val="00B050"/>
+              </a:solidFill>
+            </a:endParaRPr>
           </a:p>
           <a:p>
             <a:pPr marL="800100" lvl="1" indent="-342900">
@@ -11188,7 +11256,7 @@
         <p:spPr>
           <a:xfrm>
             <a:off x="395536" y="1844824"/>
-            <a:ext cx="8496944" cy="4124206"/>
+            <a:ext cx="8496944" cy="4524315"/>
           </a:xfrm>
           <a:prstGeom prst="rect">
             <a:avLst/>
@@ -11267,6 +11335,28 @@
               <a:buChar char="•"/>
             </a:pPr>
             <a:r>
+              <a:rPr lang="en-GB" sz="1600" dirty="0" smtClean="0"/>
+              <a:t>Instrument scripts should start with </a:t>
+            </a:r>
+            <a:r>
+              <a:rPr lang="en-GB" sz="1600" b="1" dirty="0" smtClean="0"/>
+              <a:t>from </a:t>
+            </a:r>
+            <a:r>
+              <a:rPr lang="en-GB" sz="1600" b="1" dirty="0" err="1" smtClean="0"/>
+              <a:t>genie_python</a:t>
+            </a:r>
+            <a:r>
+              <a:rPr lang="en-GB" sz="1600" b="1" dirty="0" smtClean="0"/>
+              <a:t> import genie as g</a:t>
+            </a:r>
+          </a:p>
+          <a:p>
+            <a:pPr marL="285750" indent="-285750">
+              <a:buFont typeface="Arial" panose="020B0604020202020204" pitchFamily="34" charset="0"/>
+              <a:buChar char="•"/>
+            </a:pPr>
+            <a:r>
               <a:rPr lang="en-GB" sz="1600" dirty="0" smtClean="0">
                 <a:solidFill>
                   <a:srgbClr val="00B050"/>
@@ -11410,8 +11500,36 @@
                   <a:srgbClr val="00B050"/>
                 </a:solidFill>
               </a:rPr>
-              <a:t>Ends the run</a:t>
-            </a:r>
+              <a:t>Ends the </a:t>
+            </a:r>
+            <a:r>
+              <a:rPr lang="en-GB" sz="1600" dirty="0" smtClean="0">
+                <a:solidFill>
+                  <a:srgbClr val="00B050"/>
+                </a:solidFill>
+              </a:rPr>
+              <a:t>run</a:t>
+            </a:r>
+            <a:endParaRPr lang="en-GB" sz="1600" dirty="0">
+              <a:solidFill>
+                <a:srgbClr val="00B050"/>
+              </a:solidFill>
+            </a:endParaRPr>
+          </a:p>
+          <a:p>
+            <a:r>
+              <a:rPr lang="en-GB" sz="1600" i="1" dirty="0" smtClean="0">
+                <a:solidFill>
+                  <a:srgbClr val="00B050"/>
+                </a:solidFill>
+              </a:rPr>
+              <a:t>[15 minutes]</a:t>
+            </a:r>
+            <a:endParaRPr lang="en-GB" sz="1600" i="1" dirty="0">
+              <a:solidFill>
+                <a:srgbClr val="00B050"/>
+              </a:solidFill>
+            </a:endParaRPr>
           </a:p>
         </p:txBody>
       </p:sp>
@@ -11549,7 +11667,7 @@
         <p:spPr>
           <a:xfrm>
             <a:off x="395536" y="1844824"/>
-            <a:ext cx="8496944" cy="2677656"/>
+            <a:ext cx="8496944" cy="3046988"/>
           </a:xfrm>
           <a:prstGeom prst="rect">
             <a:avLst/>
@@ -11666,13 +11784,28 @@
               <a:t>your user script </a:t>
             </a:r>
             <a:r>
-              <a:rPr lang="en-GB" sz="2400" i="1" dirty="0">
+              <a:rPr lang="en-GB" sz="2400" i="1" dirty="0" smtClean="0">
                 <a:solidFill>
                   <a:srgbClr val="00B050"/>
                 </a:solidFill>
               </a:rPr>
               <a:t>run_my_experiment.py</a:t>
             </a:r>
+          </a:p>
+          <a:p>
+            <a:r>
+              <a:rPr lang="en-GB" sz="2400" i="1" dirty="0" smtClean="0">
+                <a:solidFill>
+                  <a:srgbClr val="00B050"/>
+                </a:solidFill>
+              </a:rPr>
+              <a:t>[2 minutes]</a:t>
+            </a:r>
+            <a:endParaRPr lang="en-GB" sz="2400" i="1" dirty="0">
+              <a:solidFill>
+                <a:srgbClr val="00B050"/>
+              </a:solidFill>
+            </a:endParaRPr>
           </a:p>
         </p:txBody>
       </p:sp>
@@ -11756,7 +11889,7 @@
         <p:spPr>
           <a:xfrm>
             <a:off x="395536" y="1844824"/>
-            <a:ext cx="8496944" cy="3046988"/>
+            <a:ext cx="8496944" cy="3416320"/>
           </a:xfrm>
           <a:prstGeom prst="rect">
             <a:avLst/>
@@ -11922,9 +12055,27 @@
                   <a:srgbClr val="00B050"/>
                 </a:solidFill>
               </a:rPr>
-              <a:t>wrote earlier</a:t>
-            </a:r>
-            <a:endParaRPr lang="en-GB" sz="2400" dirty="0">
+              <a:t>wrote </a:t>
+            </a:r>
+            <a:r>
+              <a:rPr lang="en-GB" sz="2400" dirty="0" smtClean="0">
+                <a:solidFill>
+                  <a:srgbClr val="00B050"/>
+                </a:solidFill>
+              </a:rPr>
+              <a:t>earlier</a:t>
+            </a:r>
+          </a:p>
+          <a:p>
+            <a:r>
+              <a:rPr lang="en-GB" sz="2400" i="1" dirty="0" smtClean="0">
+                <a:solidFill>
+                  <a:srgbClr val="00B050"/>
+                </a:solidFill>
+              </a:rPr>
+              <a:t>[2 minutes]</a:t>
+            </a:r>
+            <a:endParaRPr lang="en-GB" sz="2400" i="1" dirty="0">
               <a:solidFill>
                 <a:srgbClr val="00B050"/>
               </a:solidFill>
@@ -12114,7 +12265,7 @@
         <p:spPr>
           <a:xfrm>
             <a:off x="395536" y="1844824"/>
-            <a:ext cx="8496944" cy="3046988"/>
+            <a:ext cx="8496944" cy="3416320"/>
           </a:xfrm>
           <a:prstGeom prst="rect">
             <a:avLst/>
@@ -12228,8 +12379,31 @@
                   <a:srgbClr val="00B050"/>
                 </a:solidFill>
               </a:rPr>
-              <a:t>function you wrote earlier</a:t>
-            </a:r>
+              <a:t>function you wrote </a:t>
+            </a:r>
+            <a:r>
+              <a:rPr lang="en-GB" sz="2400" dirty="0" smtClean="0">
+                <a:solidFill>
+                  <a:srgbClr val="00B050"/>
+                </a:solidFill>
+              </a:rPr>
+              <a:t>earlier</a:t>
+            </a:r>
+          </a:p>
+          <a:p>
+            <a:r>
+              <a:rPr lang="en-GB" sz="2400" i="1" dirty="0" smtClean="0">
+                <a:solidFill>
+                  <a:srgbClr val="00B050"/>
+                </a:solidFill>
+              </a:rPr>
+              <a:t>[2 minutes]</a:t>
+            </a:r>
+            <a:endParaRPr lang="en-GB" sz="2400" i="1" dirty="0">
+              <a:solidFill>
+                <a:srgbClr val="00B050"/>
+              </a:solidFill>
+            </a:endParaRPr>
           </a:p>
           <a:p>
             <a:pPr marL="342900" indent="-342900">
@@ -12374,7 +12548,7 @@
         <p:spPr>
           <a:xfrm>
             <a:off x="395536" y="1844824"/>
-            <a:ext cx="8496944" cy="4154984"/>
+            <a:ext cx="8496944" cy="4524315"/>
           </a:xfrm>
           <a:prstGeom prst="rect">
             <a:avLst/>
@@ -12546,8 +12720,31 @@
                   <a:srgbClr val="00B050"/>
                 </a:solidFill>
               </a:rPr>
-              <a:t>Run it again and confirm the behaviour has changed</a:t>
-            </a:r>
+              <a:t>Run it again and confirm the behaviour has </a:t>
+            </a:r>
+            <a:r>
+              <a:rPr lang="en-GB" sz="2400" dirty="0" smtClean="0">
+                <a:solidFill>
+                  <a:srgbClr val="00B050"/>
+                </a:solidFill>
+              </a:rPr>
+              <a:t>changed</a:t>
+            </a:r>
+          </a:p>
+          <a:p>
+            <a:r>
+              <a:rPr lang="en-GB" sz="2400" i="1" dirty="0" smtClean="0">
+                <a:solidFill>
+                  <a:srgbClr val="00B050"/>
+                </a:solidFill>
+              </a:rPr>
+              <a:t>[5 minutes]</a:t>
+            </a:r>
+            <a:endParaRPr lang="en-GB" sz="2400" i="1" dirty="0">
+              <a:solidFill>
+                <a:srgbClr val="00B050"/>
+              </a:solidFill>
+            </a:endParaRPr>
           </a:p>
           <a:p>
             <a:pPr marL="342900" indent="-342900">
@@ -13025,7 +13222,7 @@
         <p:spPr>
           <a:xfrm>
             <a:off x="395536" y="1844824"/>
-            <a:ext cx="8496944" cy="3416320"/>
+            <a:ext cx="8496944" cy="3693319"/>
           </a:xfrm>
           <a:prstGeom prst="rect">
             <a:avLst/>
@@ -13192,8 +13389,31 @@
                   <a:srgbClr val="00B050"/>
                 </a:solidFill>
               </a:rPr>
-              <a:t>Where was the print statement at the top of your instrument script executed?</a:t>
-            </a:r>
+              <a:t>Where was the print statement at the top of your instrument script executed</a:t>
+            </a:r>
+            <a:r>
+              <a:rPr lang="en-GB" dirty="0" smtClean="0">
+                <a:solidFill>
+                  <a:srgbClr val="00B050"/>
+                </a:solidFill>
+              </a:rPr>
+              <a:t>?</a:t>
+            </a:r>
+          </a:p>
+          <a:p>
+            <a:r>
+              <a:rPr lang="en-GB" i="1" dirty="0" smtClean="0">
+                <a:solidFill>
+                  <a:srgbClr val="00B050"/>
+                </a:solidFill>
+              </a:rPr>
+              <a:t>[30 minutes]</a:t>
+            </a:r>
+            <a:endParaRPr lang="en-GB" i="1" dirty="0">
+              <a:solidFill>
+                <a:srgbClr val="00B050"/>
+              </a:solidFill>
+            </a:endParaRPr>
           </a:p>
         </p:txBody>
       </p:sp>
@@ -14613,7 +14833,7 @@
         <p:spPr/>
         <p:txBody>
           <a:bodyPr>
-            <a:normAutofit fontScale="92500" lnSpcReduction="10000"/>
+            <a:normAutofit fontScale="92500" lnSpcReduction="20000"/>
           </a:bodyPr>
           <a:lstStyle/>
           <a:p>
@@ -14637,8 +14857,32 @@
                   <a:srgbClr val="00B050"/>
                 </a:solidFill>
               </a:rPr>
-              <a:t>Tasks in green</a:t>
-            </a:r>
+              <a:t>Tasks in </a:t>
+            </a:r>
+            <a:r>
+              <a:rPr lang="en-GB" i="1" dirty="0" smtClean="0">
+                <a:solidFill>
+                  <a:srgbClr val="00B050"/>
+                </a:solidFill>
+              </a:rPr>
+              <a:t>green</a:t>
+            </a:r>
+          </a:p>
+          <a:p>
+            <a:pPr lvl="2"/>
+            <a:r>
+              <a:rPr lang="en-GB" i="1" dirty="0" smtClean="0">
+                <a:solidFill>
+                  <a:srgbClr val="00B050"/>
+                </a:solidFill>
+              </a:rPr>
+              <a:t>Some tasks have [time limits]. Don’t worry if you don’t finish in the time</a:t>
+            </a:r>
+            <a:endParaRPr lang="en-GB" i="1" dirty="0" smtClean="0">
+              <a:solidFill>
+                <a:srgbClr val="00B050"/>
+              </a:solidFill>
+            </a:endParaRPr>
           </a:p>
           <a:p>
             <a:pPr lvl="1"/>
@@ -14922,7 +15166,7 @@
       </p:sp>
       <p:pic>
         <p:nvPicPr>
-          <p:cNvPr id="26626" name="Picture 2"/>
+          <p:cNvPr id="2050" name="Picture 2"/>
           <p:cNvPicPr>
             <a:picLocks noChangeAspect="1" noChangeArrowheads="1"/>
           </p:cNvPicPr>
@@ -14943,8 +15187,8 @@
         </p:blipFill>
         <p:spPr bwMode="auto">
           <a:xfrm>
-            <a:off x="1835696" y="1439979"/>
-            <a:ext cx="5472607" cy="4580775"/>
+            <a:off x="683568" y="1628800"/>
+            <a:ext cx="5760640" cy="4990108"/>
           </a:xfrm>
           <a:prstGeom prst="rect">
             <a:avLst/>
@@ -14974,6 +15218,43 @@
           </a:extLst>
         </p:spPr>
       </p:pic>
+      <p:sp>
+        <p:nvSpPr>
+          <p:cNvPr id="3" name="Rectangle 2"/>
+          <p:cNvSpPr/>
+          <p:nvPr/>
+        </p:nvSpPr>
+        <p:spPr>
+          <a:xfrm>
+            <a:off x="6516216" y="5085184"/>
+            <a:ext cx="1441420" cy="369332"/>
+          </a:xfrm>
+          <a:prstGeom prst="rect">
+            <a:avLst/>
+          </a:prstGeom>
+        </p:spPr>
+        <p:txBody>
+          <a:bodyPr wrap="none">
+            <a:spAutoFit/>
+          </a:bodyPr>
+          <a:lstStyle/>
+          <a:p>
+            <a:r>
+              <a:rPr lang="en-GB" i="1" dirty="0">
+                <a:solidFill>
+                  <a:srgbClr val="00B050"/>
+                </a:solidFill>
+              </a:rPr>
+              <a:t>[30 minutes]</a:t>
+            </a:r>
+            <a:endParaRPr lang="en-GB" i="1" dirty="0">
+              <a:solidFill>
+                <a:srgbClr val="00B050"/>
+              </a:solidFill>
+            </a:endParaRPr>
+          </a:p>
+        </p:txBody>
+      </p:sp>
     </p:spTree>
     <p:extLst>
       <p:ext uri="{BB962C8B-B14F-4D97-AF65-F5344CB8AC3E}">
@@ -15257,7 +15538,7 @@
         <p:spPr>
           <a:xfrm>
             <a:off x="485825" y="4869160"/>
-            <a:ext cx="8280920" cy="1200329"/>
+            <a:ext cx="8280920" cy="1477328"/>
           </a:xfrm>
           <a:prstGeom prst="rect">
             <a:avLst/>
@@ -15329,8 +15610,31 @@
                   <a:srgbClr val="00B050"/>
                 </a:solidFill>
               </a:rPr>
-              <a:t>Output the square of all the integers between 1 and 10</a:t>
-            </a:r>
+              <a:t>Output the square of all the integers between 1 and </a:t>
+            </a:r>
+            <a:r>
+              <a:rPr lang="en-GB" i="1" dirty="0" smtClean="0">
+                <a:solidFill>
+                  <a:srgbClr val="00B050"/>
+                </a:solidFill>
+              </a:rPr>
+              <a:t>10</a:t>
+            </a:r>
+          </a:p>
+          <a:p>
+            <a:r>
+              <a:rPr lang="en-GB" i="1" dirty="0" smtClean="0">
+                <a:solidFill>
+                  <a:srgbClr val="00B050"/>
+                </a:solidFill>
+              </a:rPr>
+              <a:t>[10 minutes]</a:t>
+            </a:r>
+            <a:endParaRPr lang="en-GB" i="1" dirty="0">
+              <a:solidFill>
+                <a:srgbClr val="00B050"/>
+              </a:solidFill>
+            </a:endParaRPr>
           </a:p>
           <a:p>
             <a:pPr marL="285750" indent="-285750">
@@ -15837,17 +16141,7 @@
                 <a:latin typeface="Consolas" panose="020B0609020204030204" pitchFamily="49" charset="0"/>
                 <a:cs typeface="Consolas" panose="020B0609020204030204" pitchFamily="49" charset="0"/>
               </a:rPr>
-              <a:t>(False</a:t>
-            </a:r>
-            <a:r>
-              <a:rPr lang="en-GB" sz="2400" dirty="0" smtClean="0">
-                <a:solidFill>
-                  <a:schemeClr val="accent2"/>
-                </a:solidFill>
-                <a:latin typeface="Consolas" panose="020B0609020204030204" pitchFamily="49" charset="0"/>
-                <a:cs typeface="Consolas" panose="020B0609020204030204" pitchFamily="49" charset="0"/>
-              </a:rPr>
-              <a:t>)</a:t>
+              <a:t>(False)</a:t>
             </a:r>
             <a:r>
               <a:rPr lang="en-GB" sz="2400" dirty="0" smtClean="0">
@@ -17423,14 +17717,14 @@
 <file path=customXml/itemProps2.xml><?xml version="1.0" encoding="utf-8"?>
 <ds:datastoreItem xmlns:ds="http://schemas.openxmlformats.org/officeDocument/2006/customXml" ds:itemID="{D4D0713F-2886-4B1B-9132-0812576A847F}">
   <ds:schemaRefs>
+    <ds:schemaRef ds:uri="http://schemas.microsoft.com/office/2006/metadata/properties"/>
+    <ds:schemaRef ds:uri="http://purl.org/dc/dcmitype/"/>
+    <ds:schemaRef ds:uri="http://purl.org/dc/terms/"/>
     <ds:schemaRef ds:uri="http://schemas.microsoft.com/office/2006/documentManagement/types"/>
-    <ds:schemaRef ds:uri="http://purl.org/dc/terms/"/>
-    <ds:schemaRef ds:uri="http://schemas.microsoft.com/office/2006/metadata/properties"/>
+    <ds:schemaRef ds:uri="http://www.w3.org/XML/1998/namespace"/>
+    <ds:schemaRef ds:uri="http://schemas.openxmlformats.org/package/2006/metadata/core-properties"/>
     <ds:schemaRef ds:uri="http://purl.org/dc/elements/1.1/"/>
-    <ds:schemaRef ds:uri="http://schemas.openxmlformats.org/package/2006/metadata/core-properties"/>
-    <ds:schemaRef ds:uri="http://www.w3.org/XML/1998/namespace"/>
     <ds:schemaRef ds:uri="http://schemas.microsoft.com/office/infopath/2007/PartnerControls"/>
-    <ds:schemaRef ds:uri="http://purl.org/dc/dcmitype/"/>
   </ds:schemaRefs>
 </ds:datastoreItem>
 </file>

</xml_diff>

<commit_message>
Slight changes after training
</commit_message>
<xml_diff>
--- a/genie_python_and_ibex/genie_python_and_ibex.pptx
+++ b/genie_python_and_ibex/genie_python_and_ibex.pptx
@@ -253,7 +253,7 @@
           <a:p>
             <a:fld id="{0DA9C53C-B82A-4351-B1EF-A4391C7B86A2}" type="datetimeFigureOut">
               <a:rPr lang="en-GB" smtClean="0"/>
-              <a:t>15/09/2017</a:t>
+              <a:t>16/10/2017</a:t>
             </a:fld>
             <a:endParaRPr lang="en-GB" dirty="0"/>
           </a:p>
@@ -5623,7 +5623,7 @@
               <a:pPr>
                 <a:defRPr/>
               </a:pPr>
-              <a:t>15/09/2017</a:t>
+              <a:t>16/10/2017</a:t>
             </a:fld>
             <a:endParaRPr lang="en-GB" dirty="0"/>
           </a:p>
@@ -5820,7 +5820,7 @@
               <a:pPr>
                 <a:defRPr/>
               </a:pPr>
-              <a:t>15/09/2017</a:t>
+              <a:t>16/10/2017</a:t>
             </a:fld>
             <a:endParaRPr lang="en-GB" dirty="0"/>
           </a:p>
@@ -6027,7 +6027,7 @@
               <a:pPr>
                 <a:defRPr/>
               </a:pPr>
-              <a:t>15/09/2017</a:t>
+              <a:t>16/10/2017</a:t>
             </a:fld>
             <a:endParaRPr lang="en-GB" dirty="0"/>
           </a:p>
@@ -6224,7 +6224,7 @@
               <a:pPr>
                 <a:defRPr/>
               </a:pPr>
-              <a:t>15/09/2017</a:t>
+              <a:t>16/10/2017</a:t>
             </a:fld>
             <a:endParaRPr lang="en-GB" dirty="0"/>
           </a:p>
@@ -6497,7 +6497,7 @@
               <a:pPr>
                 <a:defRPr/>
               </a:pPr>
-              <a:t>15/09/2017</a:t>
+              <a:t>16/10/2017</a:t>
             </a:fld>
             <a:endParaRPr lang="en-GB" dirty="0"/>
           </a:p>
@@ -6812,7 +6812,7 @@
               <a:pPr>
                 <a:defRPr/>
               </a:pPr>
-              <a:t>15/09/2017</a:t>
+              <a:t>16/10/2017</a:t>
             </a:fld>
             <a:endParaRPr lang="en-GB" dirty="0"/>
           </a:p>
@@ -7261,7 +7261,7 @@
               <a:pPr>
                 <a:defRPr/>
               </a:pPr>
-              <a:t>15/09/2017</a:t>
+              <a:t>16/10/2017</a:t>
             </a:fld>
             <a:endParaRPr lang="en-GB" dirty="0"/>
           </a:p>
@@ -7406,7 +7406,7 @@
               <a:pPr>
                 <a:defRPr/>
               </a:pPr>
-              <a:t>15/09/2017</a:t>
+              <a:t>16/10/2017</a:t>
             </a:fld>
             <a:endParaRPr lang="en-GB" dirty="0"/>
           </a:p>
@@ -7528,7 +7528,7 @@
               <a:pPr>
                 <a:defRPr/>
               </a:pPr>
-              <a:t>15/09/2017</a:t>
+              <a:t>16/10/2017</a:t>
             </a:fld>
             <a:endParaRPr lang="en-GB" dirty="0"/>
           </a:p>
@@ -7832,7 +7832,7 @@
               <a:pPr>
                 <a:defRPr/>
               </a:pPr>
-              <a:t>15/09/2017</a:t>
+              <a:t>16/10/2017</a:t>
             </a:fld>
             <a:endParaRPr lang="en-GB" dirty="0"/>
           </a:p>
@@ -8115,7 +8115,7 @@
               <a:pPr>
                 <a:defRPr/>
               </a:pPr>
-              <a:t>15/09/2017</a:t>
+              <a:t>16/10/2017</a:t>
             </a:fld>
             <a:endParaRPr lang="en-GB" dirty="0"/>
           </a:p>
@@ -8410,7 +8410,7 @@
               <a:pPr>
                 <a:defRPr/>
               </a:pPr>
-              <a:t>15/09/2017</a:t>
+              <a:t>16/10/2017</a:t>
             </a:fld>
             <a:endParaRPr lang="en-GB" dirty="0"/>
           </a:p>
@@ -11667,7 +11667,7 @@
         <p:spPr>
           <a:xfrm>
             <a:off x="395536" y="1844824"/>
-            <a:ext cx="8496944" cy="3046988"/>
+            <a:ext cx="8496944" cy="3785652"/>
           </a:xfrm>
           <a:prstGeom prst="rect">
             <a:avLst/>
@@ -11745,15 +11745,46 @@
               <a:t>g.load_script</a:t>
             </a:r>
             <a:r>
-              <a:rPr lang="en-GB" sz="2400" dirty="0">
+              <a:rPr lang="en-GB" sz="2400" dirty="0" smtClean="0">
                 <a:solidFill>
                   <a:schemeClr val="accent2"/>
                 </a:solidFill>
                 <a:latin typeface="Consolas" panose="020B0609020204030204" pitchFamily="49" charset="0"/>
                 <a:cs typeface="Consolas" panose="020B0609020204030204" pitchFamily="49" charset="0"/>
               </a:rPr>
-              <a:t>('C:\script\my_script.py')</a:t>
-            </a:r>
+              <a:t>(‘run_my_experiment.py')</a:t>
+            </a:r>
+          </a:p>
+          <a:p>
+            <a:pPr marL="742950" lvl="1" indent="-285750">
+              <a:buFont typeface="Arial" panose="020B0604020202020204" pitchFamily="34" charset="0"/>
+              <a:buChar char="•"/>
+            </a:pPr>
+            <a:r>
+              <a:rPr lang="en-GB" sz="2400" dirty="0" err="1" smtClean="0">
+                <a:solidFill>
+                  <a:schemeClr val="accent2"/>
+                </a:solidFill>
+                <a:latin typeface="Consolas" panose="020B0609020204030204" pitchFamily="49" charset="0"/>
+                <a:cs typeface="Consolas" panose="020B0609020204030204" pitchFamily="49" charset="0"/>
+              </a:rPr>
+              <a:t>g.load_script</a:t>
+            </a:r>
+            <a:r>
+              <a:rPr lang="en-GB" sz="2400" dirty="0" smtClean="0">
+                <a:solidFill>
+                  <a:schemeClr val="accent2"/>
+                </a:solidFill>
+                <a:latin typeface="Consolas" panose="020B0609020204030204" pitchFamily="49" charset="0"/>
+                <a:cs typeface="Consolas" panose="020B0609020204030204" pitchFamily="49" charset="0"/>
+              </a:rPr>
+              <a:t> </a:t>
+            </a:r>
+            <a:r>
+              <a:rPr lang="en-GB" sz="2400" dirty="0"/>
+              <a:t>looks automatically in “C:\scripts”. A full path can be given for other locations</a:t>
+            </a:r>
+            <a:endParaRPr lang="en-GB" sz="2400" dirty="0"/>
           </a:p>
           <a:p>
             <a:pPr marL="285750" indent="-285750">
@@ -12055,15 +12086,7 @@
                   <a:srgbClr val="00B050"/>
                 </a:solidFill>
               </a:rPr>
-              <a:t>wrote </a:t>
-            </a:r>
-            <a:r>
-              <a:rPr lang="en-GB" sz="2400" dirty="0" smtClean="0">
-                <a:solidFill>
-                  <a:srgbClr val="00B050"/>
-                </a:solidFill>
-              </a:rPr>
-              <a:t>earlier</a:t>
+              <a:t>wrote earlier</a:t>
             </a:r>
           </a:p>
           <a:p>
@@ -13222,7 +13245,7 @@
         <p:spPr>
           <a:xfrm>
             <a:off x="395536" y="1844824"/>
-            <a:ext cx="8496944" cy="3693319"/>
+            <a:ext cx="8496944" cy="4247317"/>
           </a:xfrm>
           <a:prstGeom prst="rect">
             <a:avLst/>
@@ -13275,8 +13298,35 @@
                   <a:srgbClr val="00B050"/>
                 </a:solidFill>
               </a:rPr>
-              <a:t>The function sets the title to "Ramping [block name] from [initial value] to [final value]"</a:t>
-            </a:r>
+              <a:t>The function sets the title to "Ramping [block name] from [initial value] to [final value</a:t>
+            </a:r>
+            <a:r>
+              <a:rPr lang="en-GB" dirty="0" smtClean="0">
+                <a:solidFill>
+                  <a:srgbClr val="00B050"/>
+                </a:solidFill>
+              </a:rPr>
+              <a:t>]“</a:t>
+            </a:r>
+          </a:p>
+          <a:p>
+            <a:pPr marL="1200150" lvl="2" indent="-285750">
+              <a:buFont typeface="Arial" panose="020B0604020202020204" pitchFamily="34" charset="0"/>
+              <a:buChar char="•"/>
+            </a:pPr>
+            <a:r>
+              <a:rPr lang="en-GB" dirty="0" smtClean="0">
+                <a:solidFill>
+                  <a:srgbClr val="00B050"/>
+                </a:solidFill>
+              </a:rPr>
+              <a:t>The block name, initial and final values should all be provided as input arguments</a:t>
+            </a:r>
+            <a:endParaRPr lang="en-GB" dirty="0">
+              <a:solidFill>
+                <a:srgbClr val="00B050"/>
+              </a:solidFill>
+            </a:endParaRPr>
           </a:p>
           <a:p>
             <a:pPr marL="742950" lvl="1" indent="-285750">
@@ -14857,32 +14907,19 @@
                   <a:srgbClr val="00B050"/>
                 </a:solidFill>
               </a:rPr>
-              <a:t>Tasks in </a:t>
-            </a:r>
+              <a:t>Tasks in green</a:t>
+            </a:r>
+          </a:p>
+          <a:p>
+            <a:pPr lvl="2"/>
             <a:r>
               <a:rPr lang="en-GB" i="1" dirty="0" smtClean="0">
                 <a:solidFill>
                   <a:srgbClr val="00B050"/>
                 </a:solidFill>
               </a:rPr>
-              <a:t>green</a:t>
-            </a:r>
-          </a:p>
-          <a:p>
-            <a:pPr lvl="2"/>
-            <a:r>
-              <a:rPr lang="en-GB" i="1" dirty="0" smtClean="0">
-                <a:solidFill>
-                  <a:srgbClr val="00B050"/>
-                </a:solidFill>
-              </a:rPr>
               <a:t>Some tasks have [time limits]. Don’t worry if you don’t finish in the time</a:t>
             </a:r>
-            <a:endParaRPr lang="en-GB" i="1" dirty="0" smtClean="0">
-              <a:solidFill>
-                <a:srgbClr val="00B050"/>
-              </a:solidFill>
-            </a:endParaRPr>
           </a:p>
           <a:p>
             <a:pPr lvl="1"/>
@@ -15247,11 +15284,6 @@
               </a:rPr>
               <a:t>[30 minutes]</a:t>
             </a:r>
-            <a:endParaRPr lang="en-GB" i="1" dirty="0">
-              <a:solidFill>
-                <a:srgbClr val="00B050"/>
-              </a:solidFill>
-            </a:endParaRPr>
           </a:p>
         </p:txBody>
       </p:sp>
@@ -17578,21 +17610,6 @@
 </file>
 
 <file path=customXml/item1.xml><?xml version="1.0" encoding="utf-8"?>
-<?mso-contentType ?>
-<FormTemplates xmlns="http://schemas.microsoft.com/sharepoint/v3/contenttype/forms">
-  <Display>DocumentLibraryForm</Display>
-  <Edit>DocumentLibraryForm</Edit>
-  <New>DocumentLibraryForm</New>
-</FormTemplates>
-</file>
-
-<file path=customXml/item2.xml><?xml version="1.0" encoding="utf-8"?>
-<p:properties xmlns:p="http://schemas.microsoft.com/office/2006/metadata/properties" xmlns:xsi="http://www.w3.org/2001/XMLSchema-instance" xmlns:pc="http://schemas.microsoft.com/office/infopath/2007/PartnerControls">
-  <documentManagement/>
-</p:properties>
-</file>
-
-<file path=customXml/item3.xml><?xml version="1.0" encoding="utf-8"?>
 <ct:contentTypeSchema xmlns:ct="http://schemas.microsoft.com/office/2006/metadata/contentType" xmlns:ma="http://schemas.microsoft.com/office/2006/metadata/properties/metaAttributes" ct:_="" ma:_="" ma:contentTypeName="Document" ma:contentTypeID="0x010100D8BDAAA291872E4C9CBDBAE9DC1F214B" ma:contentTypeVersion="0" ma:contentTypeDescription="Create a new document." ma:contentTypeScope="" ma:versionID="37718d931242bc0231cb88c3dc8184c7">
   <xsd:schema xmlns:xsd="http://www.w3.org/2001/XMLSchema" xmlns:xs="http://www.w3.org/2001/XMLSchema" xmlns:p="http://schemas.microsoft.com/office/2006/metadata/properties" targetNamespace="http://schemas.microsoft.com/office/2006/metadata/properties" ma:root="true" ma:fieldsID="8022916f55ab85163ee9a5069dec31d5">
     <xsd:element name="properties">
@@ -17706,10 +17723,33 @@
 </ct:contentTypeSchema>
 </file>
 
+<file path=customXml/item2.xml><?xml version="1.0" encoding="utf-8"?>
+<p:properties xmlns:p="http://schemas.microsoft.com/office/2006/metadata/properties" xmlns:xsi="http://www.w3.org/2001/XMLSchema-instance" xmlns:pc="http://schemas.microsoft.com/office/infopath/2007/PartnerControls">
+  <documentManagement/>
+</p:properties>
+</file>
+
+<file path=customXml/item3.xml><?xml version="1.0" encoding="utf-8"?>
+<?mso-contentType ?>
+<FormTemplates xmlns="http://schemas.microsoft.com/sharepoint/v3/contenttype/forms">
+  <Display>DocumentLibraryForm</Display>
+  <Edit>DocumentLibraryForm</Edit>
+  <New>DocumentLibraryForm</New>
+</FormTemplates>
+</file>
+
 <file path=customXml/itemProps1.xml><?xml version="1.0" encoding="utf-8"?>
-<ds:datastoreItem xmlns:ds="http://schemas.openxmlformats.org/officeDocument/2006/customXml" ds:itemID="{1D176834-956F-4505-BD61-698C091AD5AA}">
+<ds:datastoreItem xmlns:ds="http://schemas.openxmlformats.org/officeDocument/2006/customXml" ds:itemID="{DD040A56-8D6F-4114-A272-42AE3B7D7ECA}">
   <ds:schemaRefs>
-    <ds:schemaRef ds:uri="http://schemas.microsoft.com/sharepoint/v3/contenttype/forms"/>
+    <ds:schemaRef ds:uri="http://schemas.microsoft.com/office/2006/metadata/contentType"/>
+    <ds:schemaRef ds:uri="http://schemas.microsoft.com/office/2006/metadata/properties/metaAttributes"/>
+    <ds:schemaRef ds:uri="http://www.w3.org/2001/XMLSchema"/>
+    <ds:schemaRef ds:uri="http://schemas.microsoft.com/office/2006/metadata/properties"/>
+    <ds:schemaRef ds:uri="http://schemas.openxmlformats.org/package/2006/metadata/core-properties"/>
+    <ds:schemaRef ds:uri="http://purl.org/dc/elements/1.1/"/>
+    <ds:schemaRef ds:uri="http://purl.org/dc/terms/"/>
+    <ds:schemaRef ds:uri="http://schemas.microsoft.com/internal/obd"/>
+    <ds:schemaRef ds:uri="http://schemas.microsoft.com/office/infopath/2007/PartnerControls"/>
   </ds:schemaRefs>
 </ds:datastoreItem>
 </file>
@@ -17730,17 +17770,9 @@
 </file>
 
 <file path=customXml/itemProps3.xml><?xml version="1.0" encoding="utf-8"?>
-<ds:datastoreItem xmlns:ds="http://schemas.openxmlformats.org/officeDocument/2006/customXml" ds:itemID="{DD040A56-8D6F-4114-A272-42AE3B7D7ECA}">
+<ds:datastoreItem xmlns:ds="http://schemas.openxmlformats.org/officeDocument/2006/customXml" ds:itemID="{1D176834-956F-4505-BD61-698C091AD5AA}">
   <ds:schemaRefs>
-    <ds:schemaRef ds:uri="http://schemas.microsoft.com/office/2006/metadata/contentType"/>
-    <ds:schemaRef ds:uri="http://schemas.microsoft.com/office/2006/metadata/properties/metaAttributes"/>
-    <ds:schemaRef ds:uri="http://www.w3.org/2001/XMLSchema"/>
-    <ds:schemaRef ds:uri="http://schemas.microsoft.com/office/2006/metadata/properties"/>
-    <ds:schemaRef ds:uri="http://schemas.openxmlformats.org/package/2006/metadata/core-properties"/>
-    <ds:schemaRef ds:uri="http://purl.org/dc/elements/1.1/"/>
-    <ds:schemaRef ds:uri="http://purl.org/dc/terms/"/>
-    <ds:schemaRef ds:uri="http://schemas.microsoft.com/internal/obd"/>
-    <ds:schemaRef ds:uri="http://schemas.microsoft.com/office/infopath/2007/PartnerControls"/>
+    <ds:schemaRef ds:uri="http://schemas.microsoft.com/sharepoint/v3/contenttype/forms"/>
   </ds:schemaRefs>
 </ds:datastoreItem>
 </file>
</xml_diff>

<commit_message>
Don't make delegates type out a long bit of Python
</commit_message>
<xml_diff>
--- a/genie_python_and_ibex/genie_python_and_ibex.pptx
+++ b/genie_python_and_ibex/genie_python_and_ibex.pptx
@@ -173,7 +173,7 @@
   </p:defaultTextStyle>
   <p:extLst>
     <p:ext uri="{EFAFB233-063F-42B5-8137-9DF3F51BA10A}">
-      <p15:sldGuideLst xmlns="" xmlns:p15="http://schemas.microsoft.com/office/powerpoint/2012/main">
+      <p15:sldGuideLst xmlns:p15="http://schemas.microsoft.com/office/powerpoint/2012/main">
         <p15:guide id="1" orient="horz" pos="2160">
           <p15:clr>
             <a:srgbClr val="A4A3A4"/>
@@ -272,7 +272,7 @@
           <a:p>
             <a:fld id="{0DA9C53C-B82A-4351-B1EF-A4391C7B86A2}" type="datetimeFigureOut">
               <a:rPr lang="en-GB" smtClean="0"/>
-              <a:t>26/01/2018</a:t>
+              <a:t>29/05/2018</a:t>
             </a:fld>
             <a:endParaRPr lang="en-GB" dirty="0"/>
           </a:p>
@@ -1950,19 +1950,7 @@
                 <a:ea typeface="+mn-ea"/>
                 <a:cs typeface="+mn-cs"/>
               </a:rPr>
-              <a:t> control. Why is that good</a:t>
-            </a:r>
-            <a:r>
-              <a:rPr lang="en-GB" sz="1200" b="0" i="0" kern="1200" baseline="0" dirty="0" smtClean="0">
-                <a:solidFill>
-                  <a:schemeClr val="tx1"/>
-                </a:solidFill>
-                <a:effectLst/>
-                <a:latin typeface="+mn-lt"/>
-                <a:ea typeface="+mn-ea"/>
-                <a:cs typeface="+mn-cs"/>
-              </a:rPr>
-              <a:t>?</a:t>
+              <a:t> control. Why is that good?</a:t>
             </a:r>
             <a:endParaRPr lang="en-GB" dirty="0" smtClean="0"/>
           </a:p>
@@ -5777,7 +5765,7 @@
               <a:pPr>
                 <a:defRPr/>
               </a:pPr>
-              <a:t>26/01/2018</a:t>
+              <a:t>29/05/2018</a:t>
             </a:fld>
             <a:endParaRPr lang="en-GB" dirty="0"/>
           </a:p>
@@ -5974,7 +5962,7 @@
               <a:pPr>
                 <a:defRPr/>
               </a:pPr>
-              <a:t>26/01/2018</a:t>
+              <a:t>29/05/2018</a:t>
             </a:fld>
             <a:endParaRPr lang="en-GB" dirty="0"/>
           </a:p>
@@ -6181,7 +6169,7 @@
               <a:pPr>
                 <a:defRPr/>
               </a:pPr>
-              <a:t>26/01/2018</a:t>
+              <a:t>29/05/2018</a:t>
             </a:fld>
             <a:endParaRPr lang="en-GB" dirty="0"/>
           </a:p>
@@ -6378,7 +6366,7 @@
               <a:pPr>
                 <a:defRPr/>
               </a:pPr>
-              <a:t>26/01/2018</a:t>
+              <a:t>29/05/2018</a:t>
             </a:fld>
             <a:endParaRPr lang="en-GB" dirty="0"/>
           </a:p>
@@ -6651,7 +6639,7 @@
               <a:pPr>
                 <a:defRPr/>
               </a:pPr>
-              <a:t>26/01/2018</a:t>
+              <a:t>29/05/2018</a:t>
             </a:fld>
             <a:endParaRPr lang="en-GB" dirty="0"/>
           </a:p>
@@ -6966,7 +6954,7 @@
               <a:pPr>
                 <a:defRPr/>
               </a:pPr>
-              <a:t>26/01/2018</a:t>
+              <a:t>29/05/2018</a:t>
             </a:fld>
             <a:endParaRPr lang="en-GB" dirty="0"/>
           </a:p>
@@ -7415,7 +7403,7 @@
               <a:pPr>
                 <a:defRPr/>
               </a:pPr>
-              <a:t>26/01/2018</a:t>
+              <a:t>29/05/2018</a:t>
             </a:fld>
             <a:endParaRPr lang="en-GB" dirty="0"/>
           </a:p>
@@ -7560,7 +7548,7 @@
               <a:pPr>
                 <a:defRPr/>
               </a:pPr>
-              <a:t>26/01/2018</a:t>
+              <a:t>29/05/2018</a:t>
             </a:fld>
             <a:endParaRPr lang="en-GB" dirty="0"/>
           </a:p>
@@ -7682,7 +7670,7 @@
               <a:pPr>
                 <a:defRPr/>
               </a:pPr>
-              <a:t>26/01/2018</a:t>
+              <a:t>29/05/2018</a:t>
             </a:fld>
             <a:endParaRPr lang="en-GB" dirty="0"/>
           </a:p>
@@ -7986,7 +7974,7 @@
               <a:pPr>
                 <a:defRPr/>
               </a:pPr>
-              <a:t>26/01/2018</a:t>
+              <a:t>29/05/2018</a:t>
             </a:fld>
             <a:endParaRPr lang="en-GB" dirty="0"/>
           </a:p>
@@ -8269,7 +8257,7 @@
               <a:pPr>
                 <a:defRPr/>
               </a:pPr>
-              <a:t>26/01/2018</a:t>
+              <a:t>29/05/2018</a:t>
             </a:fld>
             <a:endParaRPr lang="en-GB" dirty="0"/>
           </a:p>
@@ -8564,7 +8552,7 @@
               <a:pPr>
                 <a:defRPr/>
               </a:pPr>
-              <a:t>26/01/2018</a:t>
+              <a:t>29/05/2018</a:t>
             </a:fld>
             <a:endParaRPr lang="en-GB" dirty="0"/>
           </a:p>
@@ -11401,11 +11389,7 @@
             </a:pPr>
             <a:r>
               <a:rPr lang="en-GB" dirty="0" smtClean="0"/>
-              <a:t>Makes </a:t>
-            </a:r>
-            <a:r>
-              <a:rPr lang="en-GB" dirty="0" smtClean="0"/>
-              <a:t>complex code easier to edit and maintain</a:t>
+              <a:t>Makes complex code easier to edit and maintain</a:t>
             </a:r>
           </a:p>
           <a:p>
@@ -11639,13 +11623,8 @@
             </a:r>
             <a:r>
               <a:rPr lang="en-GB" sz="2400" b="1" i="1" dirty="0" smtClean="0"/>
-              <a:t>C</a:t>
-            </a:r>
-            <a:r>
-              <a:rPr lang="en-GB" sz="2400" b="1" i="1" dirty="0" smtClean="0"/>
-              <a:t>:\Scripts\</a:t>
-            </a:r>
-            <a:endParaRPr lang="en-GB" sz="2400" b="1" i="1" dirty="0" smtClean="0"/>
+              <a:t>C:\Scripts\</a:t>
+            </a:r>
           </a:p>
           <a:p>
             <a:endParaRPr lang="en-GB" sz="2400" dirty="0"/>
@@ -11773,15 +11752,7 @@
             </a:r>
             <a:r>
               <a:rPr lang="en-GB" sz="2400" i="1" dirty="0" smtClean="0"/>
-              <a:t>C:\Scripts\</a:t>
-            </a:r>
-            <a:r>
-              <a:rPr lang="en-GB" sz="2400" i="1" dirty="0" smtClean="0"/>
-              <a:t>.</a:t>
-            </a:r>
-            <a:r>
-              <a:rPr lang="en-GB" sz="2400" i="1" dirty="0" smtClean="0"/>
-              <a:t> </a:t>
+              <a:t>C:\Scripts\. </a:t>
             </a:r>
             <a:r>
               <a:rPr lang="en-GB" sz="2400" dirty="0"/>
@@ -11846,7 +11817,7 @@
 </file>
 
 <file path=ppt/slides/slide17.xml><?xml version="1.0" encoding="utf-8"?>
-<p:sld xmlns:a="http://schemas.openxmlformats.org/drawingml/2006/main" xmlns:r="http://schemas.openxmlformats.org/officeDocument/2006/relationships" xmlns:p="http://schemas.openxmlformats.org/presentationml/2006/main">
+<p:sld xmlns:a="http://schemas.openxmlformats.org/drawingml/2006/main" xmlns:r="http://schemas.openxmlformats.org/officeDocument/2006/relationships" xmlns:p="http://schemas.openxmlformats.org/presentationml/2006/main" show="0">
   <p:cSld>
     <p:spTree>
       <p:nvGrpSpPr>
@@ -11878,26 +11849,10 @@
           <a:lstStyle/>
           <a:p>
             <a:r>
-              <a:rPr lang="en-GB" dirty="0" smtClean="0">
-                <a:solidFill>
-                  <a:srgbClr val="00B050"/>
-                </a:solidFill>
-              </a:rPr>
-              <a:t>Worked </a:t>
-            </a:r>
-            <a:r>
-              <a:rPr lang="en-GB" dirty="0" smtClean="0">
-                <a:solidFill>
-                  <a:srgbClr val="00B050"/>
-                </a:solidFill>
-              </a:rPr>
-              <a:t>example</a:t>
-            </a:r>
-            <a:endParaRPr lang="en-GB" dirty="0">
-              <a:solidFill>
-                <a:srgbClr val="00B050"/>
-              </a:solidFill>
-            </a:endParaRPr>
+              <a:rPr lang="en-GB" dirty="0" smtClean="0"/>
+              <a:t>Worked example</a:t>
+            </a:r>
+            <a:endParaRPr lang="en-GB" dirty="0"/>
           </a:p>
         </p:txBody>
       </p:sp>
@@ -11955,142 +11910,6 @@
           </a:extLst>
         </p:spPr>
       </p:pic>
-      <p:sp>
-        <p:nvSpPr>
-          <p:cNvPr id="4" name="Rectangle 3"/>
-          <p:cNvSpPr/>
-          <p:nvPr/>
-        </p:nvSpPr>
-        <p:spPr>
-          <a:xfrm>
-            <a:off x="5378335" y="1628800"/>
-            <a:ext cx="3765665" cy="2031325"/>
-          </a:xfrm>
-          <a:prstGeom prst="rect">
-            <a:avLst/>
-          </a:prstGeom>
-        </p:spPr>
-        <p:txBody>
-          <a:bodyPr wrap="square">
-            <a:spAutoFit/>
-          </a:bodyPr>
-          <a:lstStyle/>
-          <a:p>
-            <a:pPr marL="342900" indent="-342900">
-              <a:buFont typeface="Arial" panose="020B0604020202020204" pitchFamily="34" charset="0"/>
-              <a:buChar char="•"/>
-            </a:pPr>
-            <a:endParaRPr lang="en-GB" dirty="0" smtClean="0">
-              <a:solidFill>
-                <a:srgbClr val="00B050"/>
-              </a:solidFill>
-            </a:endParaRPr>
-          </a:p>
-          <a:p>
-            <a:pPr marL="342900" indent="-342900">
-              <a:buFont typeface="Arial" panose="020B0604020202020204" pitchFamily="34" charset="0"/>
-              <a:buChar char="•"/>
-            </a:pPr>
-            <a:r>
-              <a:rPr lang="en-GB" dirty="0" smtClean="0">
-                <a:solidFill>
-                  <a:srgbClr val="00B050"/>
-                </a:solidFill>
-              </a:rPr>
-              <a:t>Create </a:t>
-            </a:r>
-            <a:r>
-              <a:rPr lang="en-GB" dirty="0">
-                <a:solidFill>
-                  <a:srgbClr val="00B050"/>
-                </a:solidFill>
-              </a:rPr>
-              <a:t>script </a:t>
-            </a:r>
-            <a:r>
-              <a:rPr lang="en-GB" i="1" dirty="0" smtClean="0">
-                <a:solidFill>
-                  <a:srgbClr val="00B050"/>
-                </a:solidFill>
-              </a:rPr>
-              <a:t>example_script.py </a:t>
-            </a:r>
-            <a:r>
-              <a:rPr lang="en-GB" dirty="0" smtClean="0">
-                <a:solidFill>
-                  <a:srgbClr val="00B050"/>
-                </a:solidFill>
-              </a:rPr>
-              <a:t>in </a:t>
-            </a:r>
-            <a:r>
-              <a:rPr lang="en-GB" i="1" dirty="0" smtClean="0">
-                <a:solidFill>
-                  <a:srgbClr val="00B050"/>
-                </a:solidFill>
-              </a:rPr>
-              <a:t>C:\Scripts\</a:t>
-            </a:r>
-          </a:p>
-          <a:p>
-            <a:pPr marL="342900" indent="-342900">
-              <a:buFont typeface="Arial" panose="020B0604020202020204" pitchFamily="34" charset="0"/>
-              <a:buChar char="•"/>
-            </a:pPr>
-            <a:r>
-              <a:rPr lang="en-GB" dirty="0" smtClean="0">
-                <a:solidFill>
-                  <a:srgbClr val="00B050"/>
-                </a:solidFill>
-              </a:rPr>
-              <a:t>Enter the code shown on the left</a:t>
-            </a:r>
-            <a:endParaRPr lang="en-GB" dirty="0">
-              <a:solidFill>
-                <a:srgbClr val="00B050"/>
-              </a:solidFill>
-            </a:endParaRPr>
-          </a:p>
-          <a:p>
-            <a:pPr marL="342900" indent="-342900">
-              <a:buFont typeface="Arial" panose="020B0604020202020204" pitchFamily="34" charset="0"/>
-              <a:buChar char="•"/>
-            </a:pPr>
-            <a:r>
-              <a:rPr lang="en-GB" dirty="0">
-                <a:solidFill>
-                  <a:srgbClr val="00B050"/>
-                </a:solidFill>
-              </a:rPr>
-              <a:t>Load your script using the </a:t>
-            </a:r>
-            <a:r>
-              <a:rPr lang="en-GB" dirty="0" err="1">
-                <a:solidFill>
-                  <a:srgbClr val="00B050"/>
-                </a:solidFill>
-              </a:rPr>
-              <a:t>load_script</a:t>
-            </a:r>
-            <a:r>
-              <a:rPr lang="en-GB" dirty="0">
-                <a:solidFill>
-                  <a:srgbClr val="00B050"/>
-                </a:solidFill>
-              </a:rPr>
-              <a:t> </a:t>
-            </a:r>
-            <a:r>
-              <a:rPr lang="en-GB" dirty="0" smtClean="0">
-                <a:solidFill>
-                  <a:srgbClr val="00B050"/>
-                </a:solidFill>
-              </a:rPr>
-              <a:t>command</a:t>
-            </a:r>
-          </a:p>
-        </p:txBody>
-      </p:sp>
     </p:spTree>
     <p:extLst>
       <p:ext uri="{BB962C8B-B14F-4D97-AF65-F5344CB8AC3E}">
@@ -12101,6 +11920,14 @@
   <p:clrMapOvr>
     <a:masterClrMapping/>
   </p:clrMapOvr>
+  <mc:AlternateContent xmlns:mc="http://schemas.openxmlformats.org/markup-compatibility/2006">
+    <mc:Choice xmlns:p14="http://schemas.microsoft.com/office/powerpoint/2010/main" Requires="p14">
+      <p:transition spd="slow" p14:dur="2000"/>
+    </mc:Choice>
+    <mc:Fallback>
+      <p:transition spd="slow"/>
+    </mc:Fallback>
+  </mc:AlternateContent>
   <p:timing>
     <p:tnLst>
       <p:par>
@@ -12213,21 +12040,8 @@
                   <a:srgbClr val="00B050"/>
                 </a:solidFill>
               </a:rPr>
-              <a:t>Exercise </a:t>
-            </a:r>
-            <a:r>
-              <a:rPr lang="en-GB" sz="2000" b="1" dirty="0" smtClean="0">
-                <a:solidFill>
-                  <a:srgbClr val="00B050"/>
-                </a:solidFill>
-              </a:rPr>
-              <a:t>1</a:t>
-            </a:r>
-            <a:endParaRPr lang="en-GB" sz="2000" b="1" dirty="0" smtClean="0">
-              <a:solidFill>
-                <a:srgbClr val="00B050"/>
-              </a:solidFill>
-            </a:endParaRPr>
+              <a:t>Exercise 1</a:t>
+            </a:r>
           </a:p>
           <a:p>
             <a:pPr marL="285750" indent="-285750">
@@ -12602,11 +12416,7 @@
             </a:r>
             <a:r>
               <a:rPr lang="en-GB" i="1" dirty="0" smtClean="0"/>
-              <a:t>Instrument\Settings\config\&lt;Instrument name&gt;\</a:t>
-            </a:r>
-            <a:r>
-              <a:rPr lang="en-GB" i="1" dirty="0" smtClean="0"/>
-              <a:t>Python\</a:t>
+              <a:t>Instrument\Settings\config\&lt;Instrument name&gt;\Python\</a:t>
             </a:r>
             <a:r>
               <a:rPr lang="en-GB" i="1" dirty="0" err="1" smtClean="0"/>
@@ -12616,7 +12426,6 @@
               <a:rPr lang="en-GB" i="1" dirty="0" smtClean="0"/>
               <a:t>\</a:t>
             </a:r>
-            <a:endParaRPr lang="en-GB" i="1" dirty="0" smtClean="0"/>
           </a:p>
           <a:p>
             <a:pPr marL="800100" lvl="1" indent="-342900">
@@ -12979,15 +12788,7 @@
                   <a:srgbClr val="00B050"/>
                 </a:solidFill>
               </a:rPr>
-              <a:t>inutes</a:t>
-            </a:r>
-            <a:r>
-              <a:rPr lang="en-GB" i="1" dirty="0" smtClean="0">
-                <a:solidFill>
-                  <a:srgbClr val="00B050"/>
-                </a:solidFill>
-              </a:rPr>
-              <a:t>]</a:t>
+              <a:t>inutes]</a:t>
             </a:r>
             <a:endParaRPr lang="en-GB" i="1" dirty="0">
               <a:solidFill>
@@ -13175,10 +12976,6 @@
               <a:rPr lang="en-GB" dirty="0" smtClean="0"/>
               <a:t>Scripting:</a:t>
             </a:r>
-            <a:r>
-              <a:rPr lang="en-GB" dirty="0" smtClean="0"/>
-              <a:t/>
-            </a:r>
             <a:br>
               <a:rPr lang="en-GB" dirty="0" smtClean="0"/>
             </a:br>
@@ -13190,11 +12987,6 @@
               </a:rPr>
               <a:t>Exercise</a:t>
             </a:r>
-            <a:endParaRPr lang="en-GB" dirty="0">
-              <a:solidFill>
-                <a:srgbClr val="00B050"/>
-              </a:solidFill>
-            </a:endParaRPr>
           </a:p>
         </p:txBody>
       </p:sp>
@@ -13226,11 +13018,7 @@
             </a:pPr>
             <a:r>
               <a:rPr lang="en-GB" sz="1600" dirty="0" smtClean="0"/>
-              <a:t>We </a:t>
-            </a:r>
-            <a:r>
-              <a:rPr lang="en-GB" sz="1600" dirty="0" smtClean="0"/>
-              <a:t>recommend </a:t>
+              <a:t>We recommend </a:t>
             </a:r>
             <a:r>
               <a:rPr lang="en-GB" sz="1600" dirty="0"/>
@@ -13815,10 +13603,6 @@
               <a:rPr lang="en-GB" dirty="0" smtClean="0"/>
               <a:t>Scripting:</a:t>
             </a:r>
-            <a:r>
-              <a:rPr lang="en-GB" dirty="0" smtClean="0"/>
-              <a:t/>
-            </a:r>
             <a:br>
               <a:rPr lang="en-GB" dirty="0" smtClean="0"/>
             </a:br>
@@ -14084,10 +13868,6 @@
             <a:r>
               <a:rPr lang="en-GB" dirty="0" smtClean="0"/>
               <a:t>Scripting:</a:t>
-            </a:r>
-            <a:r>
-              <a:rPr lang="en-GB" dirty="0" smtClean="0"/>
-              <a:t/>
             </a:r>
             <a:br>
               <a:rPr lang="en-GB" dirty="0" smtClean="0"/>
@@ -14372,10 +14152,6 @@
               <a:rPr lang="en-GB" dirty="0" smtClean="0"/>
               <a:t>Scripting:</a:t>
             </a:r>
-            <a:r>
-              <a:rPr lang="en-GB" dirty="0" smtClean="0"/>
-              <a:t/>
-            </a:r>
             <a:br>
               <a:rPr lang="en-GB" dirty="0" smtClean="0"/>
             </a:br>
@@ -14977,10 +14753,6 @@
             <a:r>
               <a:rPr lang="en-GB" dirty="0" smtClean="0"/>
               <a:t>Scripting:</a:t>
-            </a:r>
-            <a:r>
-              <a:rPr lang="en-GB" dirty="0" smtClean="0"/>
-              <a:t/>
             </a:r>
             <a:br>
               <a:rPr lang="en-GB" dirty="0" smtClean="0"/>
@@ -15360,10 +15132,6 @@
             <a:r>
               <a:rPr lang="en-GB" dirty="0" smtClean="0"/>
               <a:t>Scripting:</a:t>
-            </a:r>
-            <a:r>
-              <a:rPr lang="en-GB" dirty="0" smtClean="0"/>
-              <a:t/>
             </a:r>
             <a:br>
               <a:rPr lang="en-GB" dirty="0" smtClean="0"/>
@@ -21095,21 +20863,6 @@
 </file>
 
 <file path=customXml/item1.xml><?xml version="1.0" encoding="utf-8"?>
-<?mso-contentType ?>
-<FormTemplates xmlns="http://schemas.microsoft.com/sharepoint/v3/contenttype/forms">
-  <Display>DocumentLibraryForm</Display>
-  <Edit>DocumentLibraryForm</Edit>
-  <New>DocumentLibraryForm</New>
-</FormTemplates>
-</file>
-
-<file path=customXml/item2.xml><?xml version="1.0" encoding="utf-8"?>
-<p:properties xmlns:p="http://schemas.microsoft.com/office/2006/metadata/properties" xmlns:xsi="http://www.w3.org/2001/XMLSchema-instance" xmlns:pc="http://schemas.microsoft.com/office/infopath/2007/PartnerControls">
-  <documentManagement/>
-</p:properties>
-</file>
-
-<file path=customXml/item3.xml><?xml version="1.0" encoding="utf-8"?>
 <ct:contentTypeSchema xmlns:ct="http://schemas.microsoft.com/office/2006/metadata/contentType" xmlns:ma="http://schemas.microsoft.com/office/2006/metadata/properties/metaAttributes" ct:_="" ma:_="" ma:contentTypeName="Document" ma:contentTypeID="0x010100D8BDAAA291872E4C9CBDBAE9DC1F214B" ma:contentTypeVersion="0" ma:contentTypeDescription="Create a new document." ma:contentTypeScope="" ma:versionID="37718d931242bc0231cb88c3dc8184c7">
   <xsd:schema xmlns:xsd="http://www.w3.org/2001/XMLSchema" xmlns:xs="http://www.w3.org/2001/XMLSchema" xmlns:p="http://schemas.microsoft.com/office/2006/metadata/properties" targetNamespace="http://schemas.microsoft.com/office/2006/metadata/properties" ma:root="true" ma:fieldsID="8022916f55ab85163ee9a5069dec31d5">
     <xsd:element name="properties">
@@ -21223,10 +20976,33 @@
 </ct:contentTypeSchema>
 </file>
 
+<file path=customXml/item2.xml><?xml version="1.0" encoding="utf-8"?>
+<p:properties xmlns:p="http://schemas.microsoft.com/office/2006/metadata/properties" xmlns:xsi="http://www.w3.org/2001/XMLSchema-instance" xmlns:pc="http://schemas.microsoft.com/office/infopath/2007/PartnerControls">
+  <documentManagement/>
+</p:properties>
+</file>
+
+<file path=customXml/item3.xml><?xml version="1.0" encoding="utf-8"?>
+<?mso-contentType ?>
+<FormTemplates xmlns="http://schemas.microsoft.com/sharepoint/v3/contenttype/forms">
+  <Display>DocumentLibraryForm</Display>
+  <Edit>DocumentLibraryForm</Edit>
+  <New>DocumentLibraryForm</New>
+</FormTemplates>
+</file>
+
 <file path=customXml/itemProps1.xml><?xml version="1.0" encoding="utf-8"?>
-<ds:datastoreItem xmlns:ds="http://schemas.openxmlformats.org/officeDocument/2006/customXml" ds:itemID="{1D176834-956F-4505-BD61-698C091AD5AA}">
+<ds:datastoreItem xmlns:ds="http://schemas.openxmlformats.org/officeDocument/2006/customXml" ds:itemID="{DD040A56-8D6F-4114-A272-42AE3B7D7ECA}">
   <ds:schemaRefs>
-    <ds:schemaRef ds:uri="http://schemas.microsoft.com/sharepoint/v3/contenttype/forms"/>
+    <ds:schemaRef ds:uri="http://schemas.microsoft.com/office/2006/metadata/contentType"/>
+    <ds:schemaRef ds:uri="http://schemas.microsoft.com/office/2006/metadata/properties/metaAttributes"/>
+    <ds:schemaRef ds:uri="http://www.w3.org/2001/XMLSchema"/>
+    <ds:schemaRef ds:uri="http://schemas.microsoft.com/office/2006/metadata/properties"/>
+    <ds:schemaRef ds:uri="http://schemas.openxmlformats.org/package/2006/metadata/core-properties"/>
+    <ds:schemaRef ds:uri="http://purl.org/dc/elements/1.1/"/>
+    <ds:schemaRef ds:uri="http://purl.org/dc/terms/"/>
+    <ds:schemaRef ds:uri="http://schemas.microsoft.com/internal/obd"/>
+    <ds:schemaRef ds:uri="http://schemas.microsoft.com/office/infopath/2007/PartnerControls"/>
   </ds:schemaRefs>
 </ds:datastoreItem>
 </file>
@@ -21247,17 +21023,9 @@
 </file>
 
 <file path=customXml/itemProps3.xml><?xml version="1.0" encoding="utf-8"?>
-<ds:datastoreItem xmlns:ds="http://schemas.openxmlformats.org/officeDocument/2006/customXml" ds:itemID="{DD040A56-8D6F-4114-A272-42AE3B7D7ECA}">
+<ds:datastoreItem xmlns:ds="http://schemas.openxmlformats.org/officeDocument/2006/customXml" ds:itemID="{1D176834-956F-4505-BD61-698C091AD5AA}">
   <ds:schemaRefs>
-    <ds:schemaRef ds:uri="http://schemas.microsoft.com/office/2006/metadata/contentType"/>
-    <ds:schemaRef ds:uri="http://schemas.microsoft.com/office/2006/metadata/properties/metaAttributes"/>
-    <ds:schemaRef ds:uri="http://www.w3.org/2001/XMLSchema"/>
-    <ds:schemaRef ds:uri="http://schemas.microsoft.com/office/2006/metadata/properties"/>
-    <ds:schemaRef ds:uri="http://schemas.openxmlformats.org/package/2006/metadata/core-properties"/>
-    <ds:schemaRef ds:uri="http://purl.org/dc/elements/1.1/"/>
-    <ds:schemaRef ds:uri="http://purl.org/dc/terms/"/>
-    <ds:schemaRef ds:uri="http://schemas.microsoft.com/internal/obd"/>
-    <ds:schemaRef ds:uri="http://schemas.microsoft.com/office/infopath/2007/PartnerControls"/>
+    <ds:schemaRef ds:uri="http://schemas.microsoft.com/sharepoint/v3/contenttype/forms"/>
   </ds:schemaRefs>
 </ds:datastoreItem>
 </file>
</xml_diff>